<commit_message>
Changed legend for grid maps
</commit_message>
<xml_diff>
--- a/Assignments/Homework02/docs/Townes_SOC5670_2020_Spring_Presentation_v00.pptx
+++ b/Assignments/Homework02/docs/Townes_SOC5670_2020_Spring_Presentation_v00.pptx
@@ -3680,7 +3680,7 @@
       </p:pic>
       <p:pic>
         <p:nvPicPr>
-          <p:cNvPr id="3" name="Picture 2"/>
+          <p:cNvPr id="4" name="Picture 3"/>
           <p:cNvPicPr>
             <a:picLocks noChangeAspect="1"/>
           </p:cNvPicPr>
@@ -3770,7 +3770,7 @@
       </p:pic>
       <p:pic>
         <p:nvPicPr>
-          <p:cNvPr id="3" name="Picture 2"/>
+          <p:cNvPr id="4" name="Picture 3"/>
           <p:cNvPicPr>
             <a:picLocks noChangeAspect="1"/>
           </p:cNvPicPr>

</xml_diff>

<commit_message>
Added OLS with dichotomous population density
</commit_message>
<xml_diff>
--- a/Assignments/Homework02/docs/Townes_SOC5670_2020_Spring_Presentation_v00.pptx
+++ b/Assignments/Homework02/docs/Townes_SOC5670_2020_Spring_Presentation_v00.pptx
@@ -19,6 +19,8 @@
     <p:sldId id="267" r:id="rId13"/>
     <p:sldId id="268" r:id="rId14"/>
     <p:sldId id="269" r:id="rId15"/>
+    <p:sldId id="270" r:id="rId16"/>
+    <p:sldId id="271" r:id="rId17"/>
   </p:sldIdLst>
   <p:sldSz cx="12192000" cy="6858000"/>
   <p:notesSz cx="6858000" cy="9144000"/>
@@ -254,7 +256,7 @@
           <a:p>
             <a:fld id="{B58C8F40-681A-4FEF-B226-47D63150CA94}" type="datetimeFigureOut">
               <a:rPr lang="en-US" smtClean="0"/>
-              <a:t>4/28/2020</a:t>
+              <a:t>4/29/2020</a:t>
             </a:fld>
             <a:endParaRPr lang="en-US"/>
           </a:p>
@@ -422,7 +424,7 @@
           <a:p>
             <a:fld id="{B58C8F40-681A-4FEF-B226-47D63150CA94}" type="datetimeFigureOut">
               <a:rPr lang="en-US" smtClean="0"/>
-              <a:t>4/28/2020</a:t>
+              <a:t>4/29/2020</a:t>
             </a:fld>
             <a:endParaRPr lang="en-US"/>
           </a:p>
@@ -600,7 +602,7 @@
           <a:p>
             <a:fld id="{B58C8F40-681A-4FEF-B226-47D63150CA94}" type="datetimeFigureOut">
               <a:rPr lang="en-US" smtClean="0"/>
-              <a:t>4/28/2020</a:t>
+              <a:t>4/29/2020</a:t>
             </a:fld>
             <a:endParaRPr lang="en-US"/>
           </a:p>
@@ -768,7 +770,7 @@
           <a:p>
             <a:fld id="{B58C8F40-681A-4FEF-B226-47D63150CA94}" type="datetimeFigureOut">
               <a:rPr lang="en-US" smtClean="0"/>
-              <a:t>4/28/2020</a:t>
+              <a:t>4/29/2020</a:t>
             </a:fld>
             <a:endParaRPr lang="en-US"/>
           </a:p>
@@ -1013,7 +1015,7 @@
           <a:p>
             <a:fld id="{B58C8F40-681A-4FEF-B226-47D63150CA94}" type="datetimeFigureOut">
               <a:rPr lang="en-US" smtClean="0"/>
-              <a:t>4/28/2020</a:t>
+              <a:t>4/29/2020</a:t>
             </a:fld>
             <a:endParaRPr lang="en-US"/>
           </a:p>
@@ -1242,7 +1244,7 @@
           <a:p>
             <a:fld id="{B58C8F40-681A-4FEF-B226-47D63150CA94}" type="datetimeFigureOut">
               <a:rPr lang="en-US" smtClean="0"/>
-              <a:t>4/28/2020</a:t>
+              <a:t>4/29/2020</a:t>
             </a:fld>
             <a:endParaRPr lang="en-US"/>
           </a:p>
@@ -1606,7 +1608,7 @@
           <a:p>
             <a:fld id="{B58C8F40-681A-4FEF-B226-47D63150CA94}" type="datetimeFigureOut">
               <a:rPr lang="en-US" smtClean="0"/>
-              <a:t>4/28/2020</a:t>
+              <a:t>4/29/2020</a:t>
             </a:fld>
             <a:endParaRPr lang="en-US"/>
           </a:p>
@@ -1723,7 +1725,7 @@
           <a:p>
             <a:fld id="{B58C8F40-681A-4FEF-B226-47D63150CA94}" type="datetimeFigureOut">
               <a:rPr lang="en-US" smtClean="0"/>
-              <a:t>4/28/2020</a:t>
+              <a:t>4/29/2020</a:t>
             </a:fld>
             <a:endParaRPr lang="en-US"/>
           </a:p>
@@ -1818,7 +1820,7 @@
           <a:p>
             <a:fld id="{B58C8F40-681A-4FEF-B226-47D63150CA94}" type="datetimeFigureOut">
               <a:rPr lang="en-US" smtClean="0"/>
-              <a:t>4/28/2020</a:t>
+              <a:t>4/29/2020</a:t>
             </a:fld>
             <a:endParaRPr lang="en-US"/>
           </a:p>
@@ -2093,7 +2095,7 @@
           <a:p>
             <a:fld id="{B58C8F40-681A-4FEF-B226-47D63150CA94}" type="datetimeFigureOut">
               <a:rPr lang="en-US" smtClean="0"/>
-              <a:t>4/28/2020</a:t>
+              <a:t>4/29/2020</a:t>
             </a:fld>
             <a:endParaRPr lang="en-US"/>
           </a:p>
@@ -2345,7 +2347,7 @@
           <a:p>
             <a:fld id="{B58C8F40-681A-4FEF-B226-47D63150CA94}" type="datetimeFigureOut">
               <a:rPr lang="en-US" smtClean="0"/>
-              <a:t>4/28/2020</a:t>
+              <a:t>4/29/2020</a:t>
             </a:fld>
             <a:endParaRPr lang="en-US"/>
           </a:p>
@@ -2556,7 +2558,7 @@
           <a:p>
             <a:fld id="{B58C8F40-681A-4FEF-B226-47D63150CA94}" type="datetimeFigureOut">
               <a:rPr lang="en-US" smtClean="0"/>
-              <a:t>4/28/2020</a:t>
+              <a:t>4/29/2020</a:t>
             </a:fld>
             <a:endParaRPr lang="en-US"/>
           </a:p>
@@ -3297,6 +3299,60 @@
       </p:grpSpPr>
       <p:pic>
         <p:nvPicPr>
+          <p:cNvPr id="2" name="Picture 1"/>
+          <p:cNvPicPr>
+            <a:picLocks noChangeAspect="1"/>
+          </p:cNvPicPr>
+          <p:nvPr/>
+        </p:nvPicPr>
+        <p:blipFill>
+          <a:blip r:embed="rId2"/>
+          <a:stretch>
+            <a:fillRect/>
+          </a:stretch>
+        </p:blipFill>
+        <p:spPr>
+          <a:xfrm>
+            <a:off x="1633195" y="0"/>
+            <a:ext cx="8925611" cy="6858000"/>
+          </a:xfrm>
+          <a:prstGeom prst="rect">
+            <a:avLst/>
+          </a:prstGeom>
+        </p:spPr>
+      </p:pic>
+    </p:spTree>
+    <p:extLst>
+      <p:ext uri="{BB962C8B-B14F-4D97-AF65-F5344CB8AC3E}">
+        <p14:creationId xmlns:p14="http://schemas.microsoft.com/office/powerpoint/2010/main" val="2956701217"/>
+      </p:ext>
+    </p:extLst>
+  </p:cSld>
+  <p:clrMapOvr>
+    <a:masterClrMapping/>
+  </p:clrMapOvr>
+</p:sld>
+</file>
+
+<file path=ppt/slides/slide15.xml><?xml version="1.0" encoding="utf-8"?>
+<p:sld xmlns:a="http://schemas.openxmlformats.org/drawingml/2006/main" xmlns:r="http://schemas.openxmlformats.org/officeDocument/2006/relationships" xmlns:p="http://schemas.openxmlformats.org/presentationml/2006/main">
+  <p:cSld>
+    <p:spTree>
+      <p:nvGrpSpPr>
+        <p:cNvPr id="1" name=""/>
+        <p:cNvGrpSpPr/>
+        <p:nvPr/>
+      </p:nvGrpSpPr>
+      <p:grpSpPr>
+        <a:xfrm>
+          <a:off x="0" y="0"/>
+          <a:ext cx="0" cy="0"/>
+          <a:chOff x="0" y="0"/>
+          <a:chExt cx="0" cy="0"/>
+        </a:xfrm>
+      </p:grpSpPr>
+      <p:pic>
+        <p:nvPicPr>
           <p:cNvPr id="3" name="Picture 2"/>
           <p:cNvPicPr>
             <a:picLocks noChangeAspect="1"/>
@@ -3311,8 +3367,8 @@
         </p:blipFill>
         <p:spPr>
           <a:xfrm>
-            <a:off x="1633194" y="0"/>
-            <a:ext cx="8925611" cy="6858000"/>
+            <a:off x="2825755" y="228600"/>
+            <a:ext cx="6540491" cy="6400800"/>
           </a:xfrm>
           <a:prstGeom prst="rect">
             <a:avLst/>
@@ -3322,7 +3378,343 @@
     </p:spTree>
     <p:extLst>
       <p:ext uri="{BB962C8B-B14F-4D97-AF65-F5344CB8AC3E}">
-        <p14:creationId xmlns:p14="http://schemas.microsoft.com/office/powerpoint/2010/main" val="2956701217"/>
+        <p14:creationId xmlns:p14="http://schemas.microsoft.com/office/powerpoint/2010/main" val="2483279243"/>
+      </p:ext>
+    </p:extLst>
+  </p:cSld>
+  <p:clrMapOvr>
+    <a:masterClrMapping/>
+  </p:clrMapOvr>
+</p:sld>
+</file>
+
+<file path=ppt/slides/slide16.xml><?xml version="1.0" encoding="utf-8"?>
+<p:sld xmlns:a="http://schemas.openxmlformats.org/drawingml/2006/main" xmlns:r="http://schemas.openxmlformats.org/officeDocument/2006/relationships" xmlns:p="http://schemas.openxmlformats.org/presentationml/2006/main">
+  <p:cSld>
+    <p:spTree>
+      <p:nvGrpSpPr>
+        <p:cNvPr id="1" name=""/>
+        <p:cNvGrpSpPr/>
+        <p:nvPr/>
+      </p:nvGrpSpPr>
+      <p:grpSpPr>
+        <a:xfrm>
+          <a:off x="0" y="0"/>
+          <a:ext cx="0" cy="0"/>
+          <a:chOff x="0" y="0"/>
+          <a:chExt cx="0" cy="0"/>
+        </a:xfrm>
+      </p:grpSpPr>
+      <p:sp>
+        <p:nvSpPr>
+          <p:cNvPr id="2" name="TextBox 1"/>
+          <p:cNvSpPr txBox="1"/>
+          <p:nvPr/>
+        </p:nvSpPr>
+        <p:spPr>
+          <a:xfrm>
+            <a:off x="2663688" y="2464904"/>
+            <a:ext cx="1298712" cy="523220"/>
+          </a:xfrm>
+          <a:prstGeom prst="rect">
+            <a:avLst/>
+          </a:prstGeom>
+          <a:noFill/>
+        </p:spPr>
+        <p:txBody>
+          <a:bodyPr wrap="square" rtlCol="0">
+            <a:spAutoFit/>
+          </a:bodyPr>
+          <a:lstStyle/>
+          <a:p>
+            <a:r>
+              <a:rPr lang="el-GR" sz="2800" dirty="0">
+                <a:latin typeface="Calibri" panose="020F0502020204030204" pitchFamily="34" charset="0"/>
+                <a:cs typeface="Calibri" panose="020F0502020204030204" pitchFamily="34" charset="0"/>
+              </a:rPr>
+              <a:t>ρ</a:t>
+            </a:r>
+            <a:r>
+              <a:rPr lang="en-US" sz="2800" baseline="-25000" dirty="0" err="1">
+                <a:latin typeface="Calibri" panose="020F0502020204030204" pitchFamily="34" charset="0"/>
+                <a:cs typeface="Calibri" panose="020F0502020204030204" pitchFamily="34" charset="0"/>
+              </a:rPr>
+              <a:t>pov|mhi</a:t>
+            </a:r>
+            <a:endParaRPr lang="en-US" sz="2800" dirty="0"/>
+          </a:p>
+        </p:txBody>
+      </p:sp>
+      <p:sp>
+        <p:nvSpPr>
+          <p:cNvPr id="5" name="TextBox 4"/>
+          <p:cNvSpPr txBox="1"/>
+          <p:nvPr/>
+        </p:nvSpPr>
+        <p:spPr>
+          <a:xfrm>
+            <a:off x="4598900" y="2464904"/>
+            <a:ext cx="583096" cy="523220"/>
+          </a:xfrm>
+          <a:prstGeom prst="rect">
+            <a:avLst/>
+          </a:prstGeom>
+          <a:noFill/>
+        </p:spPr>
+        <p:txBody>
+          <a:bodyPr wrap="square" rtlCol="0" anchor="ctr">
+            <a:spAutoFit/>
+          </a:bodyPr>
+          <a:lstStyle/>
+          <a:p>
+            <a:pPr algn="ctr"/>
+            <a:r>
+              <a:rPr lang="en-US" sz="2800" dirty="0"/>
+              <a:t>1</a:t>
+            </a:r>
+          </a:p>
+        </p:txBody>
+      </p:sp>
+      <p:cxnSp>
+        <p:nvCxnSpPr>
+          <p:cNvPr id="7" name="Straight Arrow Connector 6"/>
+          <p:cNvCxnSpPr>
+            <a:stCxn id="2" idx="3"/>
+            <a:endCxn id="5" idx="1"/>
+          </p:cNvCxnSpPr>
+          <p:nvPr/>
+        </p:nvCxnSpPr>
+        <p:spPr>
+          <a:xfrm>
+            <a:off x="3962400" y="2726514"/>
+            <a:ext cx="636500" cy="0"/>
+          </a:xfrm>
+          <a:prstGeom prst="straightConnector1">
+            <a:avLst/>
+          </a:prstGeom>
+          <a:ln w="31750">
+            <a:tailEnd type="triangle" w="med" len="lg"/>
+          </a:ln>
+        </p:spPr>
+        <p:style>
+          <a:lnRef idx="1">
+            <a:schemeClr val="accent1"/>
+          </a:lnRef>
+          <a:fillRef idx="0">
+            <a:schemeClr val="accent1"/>
+          </a:fillRef>
+          <a:effectRef idx="0">
+            <a:schemeClr val="accent1"/>
+          </a:effectRef>
+          <a:fontRef idx="minor">
+            <a:schemeClr val="tx1"/>
+          </a:fontRef>
+        </p:style>
+      </p:cxnSp>
+      <p:sp>
+        <p:nvSpPr>
+          <p:cNvPr id="8" name="TextBox 7"/>
+          <p:cNvSpPr txBox="1"/>
+          <p:nvPr/>
+        </p:nvSpPr>
+        <p:spPr>
+          <a:xfrm>
+            <a:off x="7139854" y="2464904"/>
+            <a:ext cx="857734" cy="523220"/>
+          </a:xfrm>
+          <a:prstGeom prst="rect">
+            <a:avLst/>
+          </a:prstGeom>
+          <a:noFill/>
+        </p:spPr>
+        <p:txBody>
+          <a:bodyPr wrap="square" rtlCol="0">
+            <a:spAutoFit/>
+          </a:bodyPr>
+          <a:lstStyle/>
+          <a:p>
+            <a:r>
+              <a:rPr lang="el-GR" sz="2800" dirty="0">
+                <a:latin typeface="Calibri" panose="020F0502020204030204" pitchFamily="34" charset="0"/>
+                <a:cs typeface="Calibri" panose="020F0502020204030204" pitchFamily="34" charset="0"/>
+              </a:rPr>
+              <a:t>σ</a:t>
+            </a:r>
+            <a:r>
+              <a:rPr lang="en-US" sz="2800" baseline="-25000" dirty="0" err="1">
+                <a:latin typeface="Calibri" panose="020F0502020204030204" pitchFamily="34" charset="0"/>
+                <a:cs typeface="Calibri" panose="020F0502020204030204" pitchFamily="34" charset="0"/>
+              </a:rPr>
+              <a:t>mhi</a:t>
+            </a:r>
+            <a:endParaRPr lang="en-US" sz="2800" dirty="0"/>
+          </a:p>
+        </p:txBody>
+      </p:sp>
+      <p:sp>
+        <p:nvSpPr>
+          <p:cNvPr id="9" name="TextBox 8"/>
+          <p:cNvSpPr txBox="1"/>
+          <p:nvPr/>
+        </p:nvSpPr>
+        <p:spPr>
+          <a:xfrm>
+            <a:off x="8638330" y="2464904"/>
+            <a:ext cx="583096" cy="523220"/>
+          </a:xfrm>
+          <a:prstGeom prst="rect">
+            <a:avLst/>
+          </a:prstGeom>
+          <a:noFill/>
+        </p:spPr>
+        <p:txBody>
+          <a:bodyPr wrap="square" rtlCol="0" anchor="ctr">
+            <a:spAutoFit/>
+          </a:bodyPr>
+          <a:lstStyle/>
+          <a:p>
+            <a:pPr algn="ctr"/>
+            <a:r>
+              <a:rPr lang="en-US" sz="2800" dirty="0"/>
+              <a:t>0</a:t>
+            </a:r>
+          </a:p>
+        </p:txBody>
+      </p:sp>
+      <p:cxnSp>
+        <p:nvCxnSpPr>
+          <p:cNvPr id="10" name="Straight Arrow Connector 9"/>
+          <p:cNvCxnSpPr>
+            <a:stCxn id="8" idx="3"/>
+            <a:endCxn id="9" idx="1"/>
+          </p:cNvCxnSpPr>
+          <p:nvPr/>
+        </p:nvCxnSpPr>
+        <p:spPr>
+          <a:xfrm>
+            <a:off x="7997588" y="2726514"/>
+            <a:ext cx="640742" cy="0"/>
+          </a:xfrm>
+          <a:prstGeom prst="straightConnector1">
+            <a:avLst/>
+          </a:prstGeom>
+          <a:ln w="31750">
+            <a:tailEnd type="triangle" w="med" len="lg"/>
+          </a:ln>
+        </p:spPr>
+        <p:style>
+          <a:lnRef idx="1">
+            <a:schemeClr val="accent1"/>
+          </a:lnRef>
+          <a:fillRef idx="0">
+            <a:schemeClr val="accent1"/>
+          </a:fillRef>
+          <a:effectRef idx="0">
+            <a:schemeClr val="accent1"/>
+          </a:effectRef>
+          <a:fontRef idx="minor">
+            <a:schemeClr val="tx1"/>
+          </a:fontRef>
+        </p:style>
+      </p:cxnSp>
+      <p:sp>
+        <p:nvSpPr>
+          <p:cNvPr id="11" name="TextBox 10"/>
+          <p:cNvSpPr txBox="1"/>
+          <p:nvPr/>
+        </p:nvSpPr>
+        <p:spPr>
+          <a:xfrm>
+            <a:off x="5862553" y="2464904"/>
+            <a:ext cx="583096" cy="523220"/>
+          </a:xfrm>
+          <a:prstGeom prst="rect">
+            <a:avLst/>
+          </a:prstGeom>
+          <a:noFill/>
+        </p:spPr>
+        <p:txBody>
+          <a:bodyPr wrap="square" rtlCol="0" anchor="ctr">
+            <a:spAutoFit/>
+          </a:bodyPr>
+          <a:lstStyle/>
+          <a:p>
+            <a:pPr algn="ctr"/>
+            <a:r>
+              <a:rPr lang="en-US" sz="2800" dirty="0"/>
+              <a:t>as</a:t>
+            </a:r>
+          </a:p>
+        </p:txBody>
+      </p:sp>
+      <p:sp>
+        <p:nvSpPr>
+          <p:cNvPr id="12" name="TextBox 11"/>
+          <p:cNvSpPr txBox="1"/>
+          <p:nvPr/>
+        </p:nvSpPr>
+        <p:spPr>
+          <a:xfrm>
+            <a:off x="2663688" y="3521123"/>
+            <a:ext cx="6980826" cy="1566006"/>
+          </a:xfrm>
+          <a:prstGeom prst="rect">
+            <a:avLst/>
+          </a:prstGeom>
+          <a:noFill/>
+        </p:spPr>
+        <p:txBody>
+          <a:bodyPr wrap="square" rtlCol="0">
+            <a:spAutoFit/>
+          </a:bodyPr>
+          <a:lstStyle/>
+          <a:p>
+            <a:pPr>
+              <a:lnSpc>
+                <a:spcPct val="114000"/>
+              </a:lnSpc>
+            </a:pPr>
+            <a:r>
+              <a:rPr lang="en-US" sz="2800" dirty="0"/>
+              <a:t>Where </a:t>
+            </a:r>
+          </a:p>
+          <a:p>
+            <a:pPr lvl="1">
+              <a:lnSpc>
+                <a:spcPct val="114000"/>
+              </a:lnSpc>
+            </a:pPr>
+            <a:r>
+              <a:rPr lang="en-US" sz="2800" dirty="0" err="1"/>
+              <a:t>pov</a:t>
+            </a:r>
+            <a:r>
+              <a:rPr lang="en-US" sz="2800" dirty="0"/>
+              <a:t> = poverty ratio</a:t>
+            </a:r>
+          </a:p>
+          <a:p>
+            <a:pPr lvl="1">
+              <a:lnSpc>
+                <a:spcPct val="114000"/>
+              </a:lnSpc>
+            </a:pPr>
+            <a:r>
+              <a:rPr lang="en-US" sz="2800" dirty="0" err="1"/>
+              <a:t>mhi</a:t>
+            </a:r>
+            <a:r>
+              <a:rPr lang="en-US" sz="2800" dirty="0"/>
+              <a:t> = median household income</a:t>
+            </a:r>
+          </a:p>
+        </p:txBody>
+      </p:sp>
+    </p:spTree>
+    <p:extLst>
+      <p:ext uri="{BB962C8B-B14F-4D97-AF65-F5344CB8AC3E}">
+        <p14:creationId xmlns:p14="http://schemas.microsoft.com/office/powerpoint/2010/main" val="3290647572"/>
       </p:ext>
     </p:extLst>
   </p:cSld>

</xml_diff>

<commit_message>
Correction to slide about pov and mhi
</commit_message>
<xml_diff>
--- a/Assignments/Homework02/docs/Townes_SOC5670_2020_Spring_Presentation_v00.pptx
+++ b/Assignments/Homework02/docs/Townes_SOC5670_2020_Spring_Presentation_v00.pptx
@@ -15,12 +15,13 @@
     <p:sldId id="260" r:id="rId9"/>
     <p:sldId id="263" r:id="rId10"/>
     <p:sldId id="257" r:id="rId11"/>
-    <p:sldId id="265" r:id="rId12"/>
-    <p:sldId id="267" r:id="rId13"/>
-    <p:sldId id="268" r:id="rId14"/>
-    <p:sldId id="269" r:id="rId15"/>
-    <p:sldId id="270" r:id="rId16"/>
+    <p:sldId id="267" r:id="rId12"/>
+    <p:sldId id="268" r:id="rId13"/>
+    <p:sldId id="269" r:id="rId14"/>
+    <p:sldId id="270" r:id="rId15"/>
+    <p:sldId id="272" r:id="rId16"/>
     <p:sldId id="271" r:id="rId17"/>
+    <p:sldId id="265" r:id="rId18"/>
   </p:sldIdLst>
   <p:sldSz cx="12192000" cy="6858000"/>
   <p:notesSz cx="6858000" cy="9144000"/>
@@ -3137,7 +3138,7 @@
       </p:grpSpPr>
       <p:pic>
         <p:nvPicPr>
-          <p:cNvPr id="3" name="Picture 2"/>
+          <p:cNvPr id="2" name="Picture 1"/>
           <p:cNvPicPr>
             <a:picLocks noChangeAspect="1"/>
           </p:cNvPicPr>
@@ -3151,8 +3152,8 @@
         </p:blipFill>
         <p:spPr>
           <a:xfrm>
-            <a:off x="1402079" y="1600200"/>
-            <a:ext cx="9387842" cy="3657600"/>
+            <a:off x="346699" y="96046"/>
+            <a:ext cx="11498602" cy="6665907"/>
           </a:xfrm>
           <a:prstGeom prst="rect">
             <a:avLst/>
@@ -3162,7 +3163,7 @@
     </p:spTree>
     <p:extLst>
       <p:ext uri="{BB962C8B-B14F-4D97-AF65-F5344CB8AC3E}">
-        <p14:creationId xmlns:p14="http://schemas.microsoft.com/office/powerpoint/2010/main" val="3735095028"/>
+        <p14:creationId xmlns:p14="http://schemas.microsoft.com/office/powerpoint/2010/main" val="879107697"/>
       </p:ext>
     </p:extLst>
   </p:cSld>
@@ -3216,7 +3217,7 @@
     </p:spTree>
     <p:extLst>
       <p:ext uri="{BB962C8B-B14F-4D97-AF65-F5344CB8AC3E}">
-        <p14:creationId xmlns:p14="http://schemas.microsoft.com/office/powerpoint/2010/main" val="879107697"/>
+        <p14:creationId xmlns:p14="http://schemas.microsoft.com/office/powerpoint/2010/main" val="3922517030"/>
       </p:ext>
     </p:extLst>
   </p:cSld>
@@ -3259,60 +3260,6 @@
         </p:blipFill>
         <p:spPr>
           <a:xfrm>
-            <a:off x="346699" y="96046"/>
-            <a:ext cx="11498602" cy="6665907"/>
-          </a:xfrm>
-          <a:prstGeom prst="rect">
-            <a:avLst/>
-          </a:prstGeom>
-        </p:spPr>
-      </p:pic>
-    </p:spTree>
-    <p:extLst>
-      <p:ext uri="{BB962C8B-B14F-4D97-AF65-F5344CB8AC3E}">
-        <p14:creationId xmlns:p14="http://schemas.microsoft.com/office/powerpoint/2010/main" val="3922517030"/>
-      </p:ext>
-    </p:extLst>
-  </p:cSld>
-  <p:clrMapOvr>
-    <a:masterClrMapping/>
-  </p:clrMapOvr>
-</p:sld>
-</file>
-
-<file path=ppt/slides/slide14.xml><?xml version="1.0" encoding="utf-8"?>
-<p:sld xmlns:a="http://schemas.openxmlformats.org/drawingml/2006/main" xmlns:r="http://schemas.openxmlformats.org/officeDocument/2006/relationships" xmlns:p="http://schemas.openxmlformats.org/presentationml/2006/main">
-  <p:cSld>
-    <p:spTree>
-      <p:nvGrpSpPr>
-        <p:cNvPr id="1" name=""/>
-        <p:cNvGrpSpPr/>
-        <p:nvPr/>
-      </p:nvGrpSpPr>
-      <p:grpSpPr>
-        <a:xfrm>
-          <a:off x="0" y="0"/>
-          <a:ext cx="0" cy="0"/>
-          <a:chOff x="0" y="0"/>
-          <a:chExt cx="0" cy="0"/>
-        </a:xfrm>
-      </p:grpSpPr>
-      <p:pic>
-        <p:nvPicPr>
-          <p:cNvPr id="2" name="Picture 1"/>
-          <p:cNvPicPr>
-            <a:picLocks noChangeAspect="1"/>
-          </p:cNvPicPr>
-          <p:nvPr/>
-        </p:nvPicPr>
-        <p:blipFill>
-          <a:blip r:embed="rId2"/>
-          <a:stretch>
-            <a:fillRect/>
-          </a:stretch>
-        </p:blipFill>
-        <p:spPr>
-          <a:xfrm>
             <a:off x="1633195" y="0"/>
             <a:ext cx="8925611" cy="6858000"/>
           </a:xfrm>
@@ -3334,7 +3281,7 @@
 </p:sld>
 </file>
 
-<file path=ppt/slides/slide15.xml><?xml version="1.0" encoding="utf-8"?>
+<file path=ppt/slides/slide14.xml><?xml version="1.0" encoding="utf-8"?>
 <p:sld xmlns:a="http://schemas.openxmlformats.org/drawingml/2006/main" xmlns:r="http://schemas.openxmlformats.org/officeDocument/2006/relationships" xmlns:p="http://schemas.openxmlformats.org/presentationml/2006/main">
   <p:cSld>
     <p:spTree>
@@ -3388,6 +3335,77 @@
 </p:sld>
 </file>
 
+<file path=ppt/slides/slide15.xml><?xml version="1.0" encoding="utf-8"?>
+<p:sld xmlns:a="http://schemas.openxmlformats.org/drawingml/2006/main" xmlns:r="http://schemas.openxmlformats.org/officeDocument/2006/relationships" xmlns:p="http://schemas.openxmlformats.org/presentationml/2006/main">
+  <p:cSld>
+    <p:spTree>
+      <p:nvGrpSpPr>
+        <p:cNvPr id="1" name=""/>
+        <p:cNvGrpSpPr/>
+        <p:nvPr/>
+      </p:nvGrpSpPr>
+      <p:grpSpPr>
+        <a:xfrm>
+          <a:off x="0" y="0"/>
+          <a:ext cx="0" cy="0"/>
+          <a:chOff x="0" y="0"/>
+          <a:chExt cx="0" cy="0"/>
+        </a:xfrm>
+      </p:grpSpPr>
+      <p:sp>
+        <p:nvSpPr>
+          <p:cNvPr id="2" name="Title 1"/>
+          <p:cNvSpPr>
+            <a:spLocks noGrp="1"/>
+          </p:cNvSpPr>
+          <p:nvPr>
+            <p:ph type="title"/>
+          </p:nvPr>
+        </p:nvSpPr>
+        <p:spPr/>
+        <p:txBody>
+          <a:bodyPr/>
+          <a:lstStyle/>
+          <a:p>
+            <a:r>
+              <a:rPr lang="en-US" dirty="0"/>
+              <a:t>Questions and Discussion</a:t>
+            </a:r>
+          </a:p>
+        </p:txBody>
+      </p:sp>
+      <p:sp>
+        <p:nvSpPr>
+          <p:cNvPr id="3" name="Text Placeholder 2"/>
+          <p:cNvSpPr>
+            <a:spLocks noGrp="1"/>
+          </p:cNvSpPr>
+          <p:nvPr>
+            <p:ph type="body" idx="1"/>
+          </p:nvPr>
+        </p:nvSpPr>
+        <p:spPr/>
+        <p:txBody>
+          <a:bodyPr/>
+          <a:lstStyle/>
+          <a:p>
+            <a:endParaRPr lang="en-US"/>
+          </a:p>
+        </p:txBody>
+      </p:sp>
+    </p:spTree>
+    <p:extLst>
+      <p:ext uri="{BB962C8B-B14F-4D97-AF65-F5344CB8AC3E}">
+        <p14:creationId xmlns:p14="http://schemas.microsoft.com/office/powerpoint/2010/main" val="3701280497"/>
+      </p:ext>
+    </p:extLst>
+  </p:cSld>
+  <p:clrMapOvr>
+    <a:masterClrMapping/>
+  </p:clrMapOvr>
+</p:sld>
+</file>
+
 <file path=ppt/slides/slide16.xml><?xml version="1.0" encoding="utf-8"?>
 <p:sld xmlns:a="http://schemas.openxmlformats.org/drawingml/2006/main" xmlns:r="http://schemas.openxmlformats.org/officeDocument/2006/relationships" xmlns:p="http://schemas.openxmlformats.org/presentationml/2006/main">
   <p:cSld>
@@ -3519,8 +3537,8 @@
         </p:nvSpPr>
         <p:spPr>
           <a:xfrm>
-            <a:off x="7139854" y="2464904"/>
-            <a:ext cx="857734" cy="523220"/>
+            <a:off x="7139853" y="2464904"/>
+            <a:ext cx="996981" cy="523220"/>
           </a:xfrm>
           <a:prstGeom prst="rect">
             <a:avLst/>
@@ -3545,7 +3563,7 @@
                 <a:latin typeface="Calibri" panose="020F0502020204030204" pitchFamily="34" charset="0"/>
                 <a:cs typeface="Calibri" panose="020F0502020204030204" pitchFamily="34" charset="0"/>
               </a:rPr>
-              <a:t>mhi</a:t>
+              <a:t>hhsize</a:t>
             </a:r>
             <a:endParaRPr lang="en-US" sz="2800" dirty="0"/>
           </a:p>
@@ -3559,7 +3577,7 @@
         </p:nvSpPr>
         <p:spPr>
           <a:xfrm>
-            <a:off x="8638330" y="2464904"/>
+            <a:off x="8770850" y="2464904"/>
             <a:ext cx="583096" cy="523220"/>
           </a:xfrm>
           <a:prstGeom prst="rect">
@@ -3592,8 +3610,8 @@
         </p:nvCxnSpPr>
         <p:spPr>
           <a:xfrm>
-            <a:off x="7997588" y="2726514"/>
-            <a:ext cx="640742" cy="0"/>
+            <a:off x="8136834" y="2726514"/>
+            <a:ext cx="634016" cy="0"/>
           </a:xfrm>
           <a:prstGeom prst="straightConnector1">
             <a:avLst/>
@@ -3702,11 +3720,11 @@
             </a:pPr>
             <a:r>
               <a:rPr lang="en-US" sz="2800" dirty="0" err="1"/>
-              <a:t>mhi</a:t>
+              <a:t>hhsize</a:t>
             </a:r>
             <a:r>
               <a:rPr lang="en-US" sz="2800" dirty="0"/>
-              <a:t> = median household income</a:t>
+              <a:t> = household size</a:t>
             </a:r>
           </a:p>
         </p:txBody>
@@ -3715,6 +3733,60 @@
     <p:extLst>
       <p:ext uri="{BB962C8B-B14F-4D97-AF65-F5344CB8AC3E}">
         <p14:creationId xmlns:p14="http://schemas.microsoft.com/office/powerpoint/2010/main" val="3290647572"/>
+      </p:ext>
+    </p:extLst>
+  </p:cSld>
+  <p:clrMapOvr>
+    <a:masterClrMapping/>
+  </p:clrMapOvr>
+</p:sld>
+</file>
+
+<file path=ppt/slides/slide17.xml><?xml version="1.0" encoding="utf-8"?>
+<p:sld xmlns:a="http://schemas.openxmlformats.org/drawingml/2006/main" xmlns:r="http://schemas.openxmlformats.org/officeDocument/2006/relationships" xmlns:p="http://schemas.openxmlformats.org/presentationml/2006/main">
+  <p:cSld>
+    <p:spTree>
+      <p:nvGrpSpPr>
+        <p:cNvPr id="1" name=""/>
+        <p:cNvGrpSpPr/>
+        <p:nvPr/>
+      </p:nvGrpSpPr>
+      <p:grpSpPr>
+        <a:xfrm>
+          <a:off x="0" y="0"/>
+          <a:ext cx="0" cy="0"/>
+          <a:chOff x="0" y="0"/>
+          <a:chExt cx="0" cy="0"/>
+        </a:xfrm>
+      </p:grpSpPr>
+      <p:pic>
+        <p:nvPicPr>
+          <p:cNvPr id="3" name="Picture 2"/>
+          <p:cNvPicPr>
+            <a:picLocks noChangeAspect="1"/>
+          </p:cNvPicPr>
+          <p:nvPr/>
+        </p:nvPicPr>
+        <p:blipFill>
+          <a:blip r:embed="rId2"/>
+          <a:stretch>
+            <a:fillRect/>
+          </a:stretch>
+        </p:blipFill>
+        <p:spPr>
+          <a:xfrm>
+            <a:off x="1402079" y="1600200"/>
+            <a:ext cx="9387842" cy="3657600"/>
+          </a:xfrm>
+          <a:prstGeom prst="rect">
+            <a:avLst/>
+          </a:prstGeom>
+        </p:spPr>
+      </p:pic>
+    </p:spTree>
+    <p:extLst>
+      <p:ext uri="{BB962C8B-B14F-4D97-AF65-F5344CB8AC3E}">
+        <p14:creationId xmlns:p14="http://schemas.microsoft.com/office/powerpoint/2010/main" val="3735095028"/>
       </p:ext>
     </p:extLst>
   </p:cSld>
@@ -3749,8 +3821,8 @@
         </p:nvSpPr>
         <p:spPr>
           <a:xfrm>
-            <a:off x="5336276" y="1282889"/>
-            <a:ext cx="6800577" cy="3954929"/>
+            <a:off x="4863548" y="1282889"/>
+            <a:ext cx="7273305" cy="3954929"/>
           </a:xfrm>
           <a:prstGeom prst="rect">
             <a:avLst/>
@@ -3811,7 +3883,7 @@
             </a:pPr>
             <a:r>
               <a:rPr lang="en-US" sz="2400" dirty="0"/>
-              <a:t>Slave state that remained in the Union</a:t>
+              <a:t>Within a slave state that remained in the Union</a:t>
             </a:r>
           </a:p>
           <a:p>
@@ -3918,7 +3990,7 @@
         </p:blipFill>
         <p:spPr>
           <a:xfrm>
-            <a:off x="677841" y="1282889"/>
+            <a:off x="426053" y="1282889"/>
             <a:ext cx="4167116" cy="4176216"/>
           </a:xfrm>
           <a:prstGeom prst="rect">

</xml_diff>

<commit_message>
Added research question and hypotheses to presentation
</commit_message>
<xml_diff>
--- a/Assignments/Homework02/docs/Townes_SOC5670_2020_Spring_Presentation_v00.pptx
+++ b/Assignments/Homework02/docs/Townes_SOC5670_2020_Spring_Presentation_v00.pptx
@@ -7,21 +7,24 @@
   <p:sldIdLst>
     <p:sldId id="256" r:id="rId2"/>
     <p:sldId id="261" r:id="rId3"/>
-    <p:sldId id="264" r:id="rId4"/>
-    <p:sldId id="258" r:id="rId5"/>
-    <p:sldId id="259" r:id="rId6"/>
-    <p:sldId id="266" r:id="rId7"/>
-    <p:sldId id="262" r:id="rId8"/>
-    <p:sldId id="260" r:id="rId9"/>
-    <p:sldId id="263" r:id="rId10"/>
-    <p:sldId id="257" r:id="rId11"/>
-    <p:sldId id="267" r:id="rId12"/>
-    <p:sldId id="268" r:id="rId13"/>
-    <p:sldId id="269" r:id="rId14"/>
-    <p:sldId id="270" r:id="rId15"/>
-    <p:sldId id="272" r:id="rId16"/>
-    <p:sldId id="271" r:id="rId17"/>
-    <p:sldId id="265" r:id="rId18"/>
+    <p:sldId id="274" r:id="rId4"/>
+    <p:sldId id="275" r:id="rId5"/>
+    <p:sldId id="264" r:id="rId6"/>
+    <p:sldId id="258" r:id="rId7"/>
+    <p:sldId id="259" r:id="rId8"/>
+    <p:sldId id="266" r:id="rId9"/>
+    <p:sldId id="262" r:id="rId10"/>
+    <p:sldId id="260" r:id="rId11"/>
+    <p:sldId id="263" r:id="rId12"/>
+    <p:sldId id="257" r:id="rId13"/>
+    <p:sldId id="265" r:id="rId14"/>
+    <p:sldId id="267" r:id="rId15"/>
+    <p:sldId id="268" r:id="rId16"/>
+    <p:sldId id="269" r:id="rId17"/>
+    <p:sldId id="270" r:id="rId18"/>
+    <p:sldId id="272" r:id="rId19"/>
+    <p:sldId id="273" r:id="rId20"/>
+    <p:sldId id="271" r:id="rId21"/>
   </p:sldIdLst>
   <p:sldSz cx="12192000" cy="6858000"/>
   <p:notesSz cx="6858000" cy="9144000"/>
@@ -257,7 +260,7 @@
           <a:p>
             <a:fld id="{B58C8F40-681A-4FEF-B226-47D63150CA94}" type="datetimeFigureOut">
               <a:rPr lang="en-US" smtClean="0"/>
-              <a:t>4/29/2020</a:t>
+              <a:t>4/30/2020</a:t>
             </a:fld>
             <a:endParaRPr lang="en-US"/>
           </a:p>
@@ -425,7 +428,7 @@
           <a:p>
             <a:fld id="{B58C8F40-681A-4FEF-B226-47D63150CA94}" type="datetimeFigureOut">
               <a:rPr lang="en-US" smtClean="0"/>
-              <a:t>4/29/2020</a:t>
+              <a:t>4/30/2020</a:t>
             </a:fld>
             <a:endParaRPr lang="en-US"/>
           </a:p>
@@ -603,7 +606,7 @@
           <a:p>
             <a:fld id="{B58C8F40-681A-4FEF-B226-47D63150CA94}" type="datetimeFigureOut">
               <a:rPr lang="en-US" smtClean="0"/>
-              <a:t>4/29/2020</a:t>
+              <a:t>4/30/2020</a:t>
             </a:fld>
             <a:endParaRPr lang="en-US"/>
           </a:p>
@@ -771,7 +774,7 @@
           <a:p>
             <a:fld id="{B58C8F40-681A-4FEF-B226-47D63150CA94}" type="datetimeFigureOut">
               <a:rPr lang="en-US" smtClean="0"/>
-              <a:t>4/29/2020</a:t>
+              <a:t>4/30/2020</a:t>
             </a:fld>
             <a:endParaRPr lang="en-US"/>
           </a:p>
@@ -1016,7 +1019,7 @@
           <a:p>
             <a:fld id="{B58C8F40-681A-4FEF-B226-47D63150CA94}" type="datetimeFigureOut">
               <a:rPr lang="en-US" smtClean="0"/>
-              <a:t>4/29/2020</a:t>
+              <a:t>4/30/2020</a:t>
             </a:fld>
             <a:endParaRPr lang="en-US"/>
           </a:p>
@@ -1245,7 +1248,7 @@
           <a:p>
             <a:fld id="{B58C8F40-681A-4FEF-B226-47D63150CA94}" type="datetimeFigureOut">
               <a:rPr lang="en-US" smtClean="0"/>
-              <a:t>4/29/2020</a:t>
+              <a:t>4/30/2020</a:t>
             </a:fld>
             <a:endParaRPr lang="en-US"/>
           </a:p>
@@ -1609,7 +1612,7 @@
           <a:p>
             <a:fld id="{B58C8F40-681A-4FEF-B226-47D63150CA94}" type="datetimeFigureOut">
               <a:rPr lang="en-US" smtClean="0"/>
-              <a:t>4/29/2020</a:t>
+              <a:t>4/30/2020</a:t>
             </a:fld>
             <a:endParaRPr lang="en-US"/>
           </a:p>
@@ -1726,7 +1729,7 @@
           <a:p>
             <a:fld id="{B58C8F40-681A-4FEF-B226-47D63150CA94}" type="datetimeFigureOut">
               <a:rPr lang="en-US" smtClean="0"/>
-              <a:t>4/29/2020</a:t>
+              <a:t>4/30/2020</a:t>
             </a:fld>
             <a:endParaRPr lang="en-US"/>
           </a:p>
@@ -1821,7 +1824,7 @@
           <a:p>
             <a:fld id="{B58C8F40-681A-4FEF-B226-47D63150CA94}" type="datetimeFigureOut">
               <a:rPr lang="en-US" smtClean="0"/>
-              <a:t>4/29/2020</a:t>
+              <a:t>4/30/2020</a:t>
             </a:fld>
             <a:endParaRPr lang="en-US"/>
           </a:p>
@@ -2096,7 +2099,7 @@
           <a:p>
             <a:fld id="{B58C8F40-681A-4FEF-B226-47D63150CA94}" type="datetimeFigureOut">
               <a:rPr lang="en-US" smtClean="0"/>
-              <a:t>4/29/2020</a:t>
+              <a:t>4/30/2020</a:t>
             </a:fld>
             <a:endParaRPr lang="en-US"/>
           </a:p>
@@ -2348,7 +2351,7 @@
           <a:p>
             <a:fld id="{B58C8F40-681A-4FEF-B226-47D63150CA94}" type="datetimeFigureOut">
               <a:rPr lang="en-US" smtClean="0"/>
-              <a:t>4/29/2020</a:t>
+              <a:t>4/30/2020</a:t>
             </a:fld>
             <a:endParaRPr lang="en-US"/>
           </a:p>
@@ -2559,7 +2562,7 @@
           <a:p>
             <a:fld id="{B58C8F40-681A-4FEF-B226-47D63150CA94}" type="datetimeFigureOut">
               <a:rPr lang="en-US" smtClean="0"/>
-              <a:t>4/29/2020</a:t>
+              <a:t>4/30/2020</a:t>
             </a:fld>
             <a:endParaRPr lang="en-US"/>
           </a:p>
@@ -3030,8 +3033,8 @@
         </p:nvSpPr>
         <p:spPr>
           <a:xfrm>
-            <a:off x="1630018" y="5751444"/>
-            <a:ext cx="8931965" cy="461665"/>
+            <a:off x="1630018" y="5314128"/>
+            <a:ext cx="8931965" cy="830997"/>
           </a:xfrm>
           <a:prstGeom prst="rect">
             <a:avLst/>
@@ -3043,6 +3046,13 @@
             <a:spAutoFit/>
           </a:bodyPr>
           <a:lstStyle/>
+          <a:p>
+            <a:pPr algn="ctr"/>
+            <a:r>
+              <a:rPr lang="en-US" sz="2400" dirty="0"/>
+              <a:t>Preliminary Results</a:t>
+            </a:r>
+          </a:p>
           <a:p>
             <a:pPr algn="ctr"/>
             <a:r>
@@ -3084,32 +3094,124 @@
       </p:grpSpPr>
       <p:pic>
         <p:nvPicPr>
-          <p:cNvPr id="2" name="Picture 1"/>
+          <p:cNvPr id="5" name="Picture 4"/>
           <p:cNvPicPr>
             <a:picLocks noChangeAspect="1"/>
           </p:cNvPicPr>
           <p:nvPr/>
         </p:nvPicPr>
-        <p:blipFill>
-          <a:blip r:embed="rId2"/>
-          <a:stretch>
-            <a:fillRect/>
-          </a:stretch>
+        <p:blipFill rotWithShape="1">
+          <a:blip r:embed="rId2">
+            <a:extLst>
+              <a:ext uri="{28A0092B-C50C-407E-A947-70E740481C1C}">
+                <a14:useLocalDpi xmlns:a14="http://schemas.microsoft.com/office/drawing/2010/main" val="0"/>
+              </a:ext>
+            </a:extLst>
+          </a:blip>
+          <a:srcRect l="25182" r="6394"/>
+          <a:stretch/>
         </p:blipFill>
         <p:spPr>
           <a:xfrm>
-            <a:off x="2407768" y="228600"/>
-            <a:ext cx="7376464" cy="6400800"/>
+            <a:off x="7591952" y="989416"/>
+            <a:ext cx="4572000" cy="4802071"/>
           </a:xfrm>
           <a:prstGeom prst="rect">
             <a:avLst/>
           </a:prstGeom>
         </p:spPr>
       </p:pic>
+      <p:pic>
+        <p:nvPicPr>
+          <p:cNvPr id="4" name="Picture 3"/>
+          <p:cNvPicPr>
+            <a:picLocks noChangeAspect="1"/>
+          </p:cNvPicPr>
+          <p:nvPr/>
+        </p:nvPicPr>
+        <p:blipFill rotWithShape="1">
+          <a:blip r:embed="rId3">
+            <a:extLst>
+              <a:ext uri="{28A0092B-C50C-407E-A947-70E740481C1C}">
+                <a14:useLocalDpi xmlns:a14="http://schemas.microsoft.com/office/drawing/2010/main" val="0"/>
+              </a:ext>
+            </a:extLst>
+          </a:blip>
+          <a:srcRect l="25248" r="7187"/>
+          <a:stretch/>
+        </p:blipFill>
+        <p:spPr>
+          <a:xfrm>
+            <a:off x="3179109" y="958892"/>
+            <a:ext cx="4572000" cy="4863118"/>
+          </a:xfrm>
+          <a:prstGeom prst="rect">
+            <a:avLst/>
+          </a:prstGeom>
+        </p:spPr>
+      </p:pic>
+      <p:pic>
+        <p:nvPicPr>
+          <p:cNvPr id="3" name="Picture 2"/>
+          <p:cNvPicPr>
+            <a:picLocks noChangeAspect="1"/>
+          </p:cNvPicPr>
+          <p:nvPr/>
+        </p:nvPicPr>
+        <p:blipFill rotWithShape="1">
+          <a:blip r:embed="rId4">
+            <a:extLst>
+              <a:ext uri="{28A0092B-C50C-407E-A947-70E740481C1C}">
+                <a14:useLocalDpi xmlns:a14="http://schemas.microsoft.com/office/drawing/2010/main" val="0"/>
+              </a:ext>
+            </a:extLst>
+          </a:blip>
+          <a:srcRect l="24778" r="25661"/>
+          <a:stretch/>
+        </p:blipFill>
+        <p:spPr>
+          <a:xfrm>
+            <a:off x="0" y="1742884"/>
+            <a:ext cx="3200400" cy="3295134"/>
+          </a:xfrm>
+          <a:prstGeom prst="rect">
+            <a:avLst/>
+          </a:prstGeom>
+        </p:spPr>
+      </p:pic>
+      <p:sp>
+        <p:nvSpPr>
+          <p:cNvPr id="6" name="TextBox 5"/>
+          <p:cNvSpPr txBox="1"/>
+          <p:nvPr/>
+        </p:nvSpPr>
+        <p:spPr>
+          <a:xfrm>
+            <a:off x="609600" y="6091986"/>
+            <a:ext cx="10972800" cy="369332"/>
+          </a:xfrm>
+          <a:prstGeom prst="rect">
+            <a:avLst/>
+          </a:prstGeom>
+          <a:noFill/>
+        </p:spPr>
+        <p:txBody>
+          <a:bodyPr wrap="square" rtlCol="0">
+            <a:spAutoFit/>
+          </a:bodyPr>
+          <a:lstStyle/>
+          <a:p>
+            <a:r>
+              <a:rPr lang="en-US" dirty="0"/>
+              <a:t>Bivariate LISA indicates mostly positive spatial autocorrelation between Black population ratio and poverty.</a:t>
+            </a:r>
+          </a:p>
+        </p:txBody>
+      </p:sp>
     </p:spTree>
     <p:extLst>
       <p:ext uri="{BB962C8B-B14F-4D97-AF65-F5344CB8AC3E}">
-        <p14:creationId xmlns:p14="http://schemas.microsoft.com/office/powerpoint/2010/main" val="687521852"/>
+        <p14:creationId xmlns:p14="http://schemas.microsoft.com/office/powerpoint/2010/main" val="2400817694"/>
       </p:ext>
     </p:extLst>
   </p:cSld>
@@ -3144,26 +3246,118 @@
           </p:cNvPicPr>
           <p:nvPr/>
         </p:nvPicPr>
-        <p:blipFill>
-          <a:blip r:embed="rId2"/>
-          <a:stretch>
-            <a:fillRect/>
-          </a:stretch>
+        <p:blipFill rotWithShape="1">
+          <a:blip r:embed="rId2">
+            <a:extLst>
+              <a:ext uri="{28A0092B-C50C-407E-A947-70E740481C1C}">
+                <a14:useLocalDpi xmlns:a14="http://schemas.microsoft.com/office/drawing/2010/main" val="0"/>
+              </a:ext>
+            </a:extLst>
+          </a:blip>
+          <a:srcRect l="24291" r="26396"/>
+          <a:stretch/>
         </p:blipFill>
         <p:spPr>
           <a:xfrm>
-            <a:off x="346699" y="96046"/>
-            <a:ext cx="11498602" cy="6665907"/>
+            <a:off x="0" y="1818704"/>
+            <a:ext cx="3200400" cy="3311525"/>
           </a:xfrm>
           <a:prstGeom prst="rect">
             <a:avLst/>
           </a:prstGeom>
         </p:spPr>
       </p:pic>
+      <p:pic>
+        <p:nvPicPr>
+          <p:cNvPr id="3" name="Picture 2"/>
+          <p:cNvPicPr>
+            <a:picLocks noChangeAspect="1"/>
+          </p:cNvPicPr>
+          <p:nvPr/>
+        </p:nvPicPr>
+        <p:blipFill rotWithShape="1">
+          <a:blip r:embed="rId3">
+            <a:extLst>
+              <a:ext uri="{28A0092B-C50C-407E-A947-70E740481C1C}">
+                <a14:useLocalDpi xmlns:a14="http://schemas.microsoft.com/office/drawing/2010/main" val="0"/>
+              </a:ext>
+            </a:extLst>
+          </a:blip>
+          <a:srcRect l="25187" r="7820"/>
+          <a:stretch/>
+        </p:blipFill>
+        <p:spPr>
+          <a:xfrm>
+            <a:off x="3200400" y="1022121"/>
+            <a:ext cx="4572000" cy="4904690"/>
+          </a:xfrm>
+          <a:prstGeom prst="rect">
+            <a:avLst/>
+          </a:prstGeom>
+        </p:spPr>
+      </p:pic>
+      <p:pic>
+        <p:nvPicPr>
+          <p:cNvPr id="4" name="Picture 3"/>
+          <p:cNvPicPr>
+            <a:picLocks noChangeAspect="1"/>
+          </p:cNvPicPr>
+          <p:nvPr/>
+        </p:nvPicPr>
+        <p:blipFill rotWithShape="1">
+          <a:blip r:embed="rId4">
+            <a:extLst>
+              <a:ext uri="{28A0092B-C50C-407E-A947-70E740481C1C}">
+                <a14:useLocalDpi xmlns:a14="http://schemas.microsoft.com/office/drawing/2010/main" val="0"/>
+              </a:ext>
+            </a:extLst>
+          </a:blip>
+          <a:srcRect l="25760" r="6960"/>
+          <a:stretch/>
+        </p:blipFill>
+        <p:spPr>
+          <a:xfrm>
+            <a:off x="7620000" y="1032561"/>
+            <a:ext cx="4572000" cy="4883810"/>
+          </a:xfrm>
+          <a:prstGeom prst="rect">
+            <a:avLst/>
+          </a:prstGeom>
+        </p:spPr>
+      </p:pic>
+      <p:sp>
+        <p:nvSpPr>
+          <p:cNvPr id="5" name="TextBox 4"/>
+          <p:cNvSpPr txBox="1"/>
+          <p:nvPr/>
+        </p:nvSpPr>
+        <p:spPr>
+          <a:xfrm>
+            <a:off x="609600" y="6091986"/>
+            <a:ext cx="10972800" cy="369332"/>
+          </a:xfrm>
+          <a:prstGeom prst="rect">
+            <a:avLst/>
+          </a:prstGeom>
+          <a:noFill/>
+        </p:spPr>
+        <p:txBody>
+          <a:bodyPr wrap="square" rtlCol="0">
+            <a:spAutoFit/>
+          </a:bodyPr>
+          <a:lstStyle/>
+          <a:p>
+            <a:r>
+              <a:rPr lang="en-US" dirty="0"/>
+              <a:t>Bivariate LISA indicates mostly negative spatial autocorrelation between White population ratio and poverty.</a:t>
+            </a:r>
+          </a:p>
+        </p:txBody>
+      </p:sp>
     </p:spTree>
     <p:extLst>
       <p:ext uri="{BB962C8B-B14F-4D97-AF65-F5344CB8AC3E}">
-        <p14:creationId xmlns:p14="http://schemas.microsoft.com/office/powerpoint/2010/main" val="879107697"/>
+        <p14:creationId xmlns:p14="http://schemas.microsoft.com/office/powerpoint/2010/main" val="1519220900"/>
       </p:ext>
     </p:extLst>
   </p:cSld>
@@ -3206,8 +3400,8 @@
         </p:blipFill>
         <p:spPr>
           <a:xfrm>
-            <a:off x="346699" y="96046"/>
-            <a:ext cx="11498602" cy="6665907"/>
+            <a:off x="2407768" y="228600"/>
+            <a:ext cx="7376464" cy="6400800"/>
           </a:xfrm>
           <a:prstGeom prst="rect">
             <a:avLst/>
@@ -3217,7 +3411,7 @@
     </p:spTree>
     <p:extLst>
       <p:ext uri="{BB962C8B-B14F-4D97-AF65-F5344CB8AC3E}">
-        <p14:creationId xmlns:p14="http://schemas.microsoft.com/office/powerpoint/2010/main" val="3922517030"/>
+        <p14:creationId xmlns:p14="http://schemas.microsoft.com/office/powerpoint/2010/main" val="687521852"/>
       </p:ext>
     </p:extLst>
   </p:cSld>
@@ -3260,8 +3454,8 @@
         </p:blipFill>
         <p:spPr>
           <a:xfrm>
-            <a:off x="1633195" y="0"/>
-            <a:ext cx="8925611" cy="6858000"/>
+            <a:off x="1456695" y="1143000"/>
+            <a:ext cx="9278610" cy="4572000"/>
           </a:xfrm>
           <a:prstGeom prst="rect">
             <a:avLst/>
@@ -3271,7 +3465,7 @@
     </p:spTree>
     <p:extLst>
       <p:ext uri="{BB962C8B-B14F-4D97-AF65-F5344CB8AC3E}">
-        <p14:creationId xmlns:p14="http://schemas.microsoft.com/office/powerpoint/2010/main" val="2956701217"/>
+        <p14:creationId xmlns:p14="http://schemas.microsoft.com/office/powerpoint/2010/main" val="3735095028"/>
       </p:ext>
     </p:extLst>
   </p:cSld>
@@ -3300,7 +3494,7 @@
       </p:grpSpPr>
       <p:pic>
         <p:nvPicPr>
-          <p:cNvPr id="3" name="Picture 2"/>
+          <p:cNvPr id="2" name="Picture 1"/>
           <p:cNvPicPr>
             <a:picLocks noChangeAspect="1"/>
           </p:cNvPicPr>
@@ -3314,8 +3508,8 @@
         </p:blipFill>
         <p:spPr>
           <a:xfrm>
-            <a:off x="2825755" y="228600"/>
-            <a:ext cx="6540491" cy="6400800"/>
+            <a:off x="346699" y="96046"/>
+            <a:ext cx="11498602" cy="6665907"/>
           </a:xfrm>
           <a:prstGeom prst="rect">
             <a:avLst/>
@@ -3325,7 +3519,7 @@
     </p:spTree>
     <p:extLst>
       <p:ext uri="{BB962C8B-B14F-4D97-AF65-F5344CB8AC3E}">
-        <p14:creationId xmlns:p14="http://schemas.microsoft.com/office/powerpoint/2010/main" val="2483279243"/>
+        <p14:creationId xmlns:p14="http://schemas.microsoft.com/office/powerpoint/2010/main" val="879107697"/>
       </p:ext>
     </p:extLst>
   </p:cSld>
@@ -3352,51 +3546,34 @@
           <a:chExt cx="0" cy="0"/>
         </a:xfrm>
       </p:grpSpPr>
-      <p:sp>
-        <p:nvSpPr>
-          <p:cNvPr id="2" name="Title 1"/>
-          <p:cNvSpPr>
-            <a:spLocks noGrp="1"/>
-          </p:cNvSpPr>
-          <p:nvPr>
-            <p:ph type="title"/>
-          </p:nvPr>
-        </p:nvSpPr>
-        <p:spPr/>
-        <p:txBody>
-          <a:bodyPr/>
-          <a:lstStyle/>
-          <a:p>
-            <a:r>
-              <a:rPr lang="en-US" dirty="0"/>
-              <a:t>Questions and Discussion</a:t>
-            </a:r>
-          </a:p>
-        </p:txBody>
-      </p:sp>
-      <p:sp>
-        <p:nvSpPr>
-          <p:cNvPr id="3" name="Text Placeholder 2"/>
-          <p:cNvSpPr>
-            <a:spLocks noGrp="1"/>
-          </p:cNvSpPr>
-          <p:nvPr>
-            <p:ph type="body" idx="1"/>
-          </p:nvPr>
-        </p:nvSpPr>
-        <p:spPr/>
-        <p:txBody>
-          <a:bodyPr/>
-          <a:lstStyle/>
-          <a:p>
-            <a:endParaRPr lang="en-US"/>
-          </a:p>
-        </p:txBody>
-      </p:sp>
+      <p:pic>
+        <p:nvPicPr>
+          <p:cNvPr id="2" name="Picture 1"/>
+          <p:cNvPicPr>
+            <a:picLocks noChangeAspect="1"/>
+          </p:cNvPicPr>
+          <p:nvPr/>
+        </p:nvPicPr>
+        <p:blipFill>
+          <a:blip r:embed="rId2"/>
+          <a:stretch>
+            <a:fillRect/>
+          </a:stretch>
+        </p:blipFill>
+        <p:spPr>
+          <a:xfrm>
+            <a:off x="346699" y="96046"/>
+            <a:ext cx="11498602" cy="6665907"/>
+          </a:xfrm>
+          <a:prstGeom prst="rect">
+            <a:avLst/>
+          </a:prstGeom>
+        </p:spPr>
+      </p:pic>
     </p:spTree>
     <p:extLst>
       <p:ext uri="{BB962C8B-B14F-4D97-AF65-F5344CB8AC3E}">
-        <p14:creationId xmlns:p14="http://schemas.microsoft.com/office/powerpoint/2010/main" val="3701280497"/>
+        <p14:creationId xmlns:p14="http://schemas.microsoft.com/office/powerpoint/2010/main" val="3922517030"/>
       </p:ext>
     </p:extLst>
   </p:cSld>
@@ -3423,316 +3600,34 @@
           <a:chExt cx="0" cy="0"/>
         </a:xfrm>
       </p:grpSpPr>
-      <p:sp>
-        <p:nvSpPr>
-          <p:cNvPr id="2" name="TextBox 1"/>
-          <p:cNvSpPr txBox="1"/>
+      <p:pic>
+        <p:nvPicPr>
+          <p:cNvPr id="2" name="Picture 1"/>
+          <p:cNvPicPr>
+            <a:picLocks noChangeAspect="1"/>
+          </p:cNvPicPr>
           <p:nvPr/>
-        </p:nvSpPr>
-        <p:spPr>
-          <a:xfrm>
-            <a:off x="2663688" y="2464904"/>
-            <a:ext cx="1298712" cy="523220"/>
+        </p:nvPicPr>
+        <p:blipFill>
+          <a:blip r:embed="rId2"/>
+          <a:stretch>
+            <a:fillRect/>
+          </a:stretch>
+        </p:blipFill>
+        <p:spPr>
+          <a:xfrm>
+            <a:off x="1633195" y="0"/>
+            <a:ext cx="8925611" cy="6858000"/>
           </a:xfrm>
           <a:prstGeom prst="rect">
             <a:avLst/>
           </a:prstGeom>
-          <a:noFill/>
-        </p:spPr>
-        <p:txBody>
-          <a:bodyPr wrap="square" rtlCol="0">
-            <a:spAutoFit/>
-          </a:bodyPr>
-          <a:lstStyle/>
-          <a:p>
-            <a:r>
-              <a:rPr lang="el-GR" sz="2800" dirty="0">
-                <a:latin typeface="Calibri" panose="020F0502020204030204" pitchFamily="34" charset="0"/>
-                <a:cs typeface="Calibri" panose="020F0502020204030204" pitchFamily="34" charset="0"/>
-              </a:rPr>
-              <a:t>ρ</a:t>
-            </a:r>
-            <a:r>
-              <a:rPr lang="en-US" sz="2800" baseline="-25000" dirty="0" err="1">
-                <a:latin typeface="Calibri" panose="020F0502020204030204" pitchFamily="34" charset="0"/>
-                <a:cs typeface="Calibri" panose="020F0502020204030204" pitchFamily="34" charset="0"/>
-              </a:rPr>
-              <a:t>pov|mhi</a:t>
-            </a:r>
-            <a:endParaRPr lang="en-US" sz="2800" dirty="0"/>
-          </a:p>
-        </p:txBody>
-      </p:sp>
-      <p:sp>
-        <p:nvSpPr>
-          <p:cNvPr id="5" name="TextBox 4"/>
-          <p:cNvSpPr txBox="1"/>
-          <p:nvPr/>
-        </p:nvSpPr>
-        <p:spPr>
-          <a:xfrm>
-            <a:off x="4598900" y="2464904"/>
-            <a:ext cx="583096" cy="523220"/>
-          </a:xfrm>
-          <a:prstGeom prst="rect">
-            <a:avLst/>
-          </a:prstGeom>
-          <a:noFill/>
-        </p:spPr>
-        <p:txBody>
-          <a:bodyPr wrap="square" rtlCol="0" anchor="ctr">
-            <a:spAutoFit/>
-          </a:bodyPr>
-          <a:lstStyle/>
-          <a:p>
-            <a:pPr algn="ctr"/>
-            <a:r>
-              <a:rPr lang="en-US" sz="2800" dirty="0"/>
-              <a:t>1</a:t>
-            </a:r>
-          </a:p>
-        </p:txBody>
-      </p:sp>
-      <p:cxnSp>
-        <p:nvCxnSpPr>
-          <p:cNvPr id="7" name="Straight Arrow Connector 6"/>
-          <p:cNvCxnSpPr>
-            <a:stCxn id="2" idx="3"/>
-            <a:endCxn id="5" idx="1"/>
-          </p:cNvCxnSpPr>
-          <p:nvPr/>
-        </p:nvCxnSpPr>
-        <p:spPr>
-          <a:xfrm>
-            <a:off x="3962400" y="2726514"/>
-            <a:ext cx="636500" cy="0"/>
-          </a:xfrm>
-          <a:prstGeom prst="straightConnector1">
-            <a:avLst/>
-          </a:prstGeom>
-          <a:ln w="31750">
-            <a:tailEnd type="triangle" w="med" len="lg"/>
-          </a:ln>
-        </p:spPr>
-        <p:style>
-          <a:lnRef idx="1">
-            <a:schemeClr val="accent1"/>
-          </a:lnRef>
-          <a:fillRef idx="0">
-            <a:schemeClr val="accent1"/>
-          </a:fillRef>
-          <a:effectRef idx="0">
-            <a:schemeClr val="accent1"/>
-          </a:effectRef>
-          <a:fontRef idx="minor">
-            <a:schemeClr val="tx1"/>
-          </a:fontRef>
-        </p:style>
-      </p:cxnSp>
-      <p:sp>
-        <p:nvSpPr>
-          <p:cNvPr id="8" name="TextBox 7"/>
-          <p:cNvSpPr txBox="1"/>
-          <p:nvPr/>
-        </p:nvSpPr>
-        <p:spPr>
-          <a:xfrm>
-            <a:off x="7139853" y="2464904"/>
-            <a:ext cx="996981" cy="523220"/>
-          </a:xfrm>
-          <a:prstGeom prst="rect">
-            <a:avLst/>
-          </a:prstGeom>
-          <a:noFill/>
-        </p:spPr>
-        <p:txBody>
-          <a:bodyPr wrap="square" rtlCol="0">
-            <a:spAutoFit/>
-          </a:bodyPr>
-          <a:lstStyle/>
-          <a:p>
-            <a:r>
-              <a:rPr lang="el-GR" sz="2800" dirty="0">
-                <a:latin typeface="Calibri" panose="020F0502020204030204" pitchFamily="34" charset="0"/>
-                <a:cs typeface="Calibri" panose="020F0502020204030204" pitchFamily="34" charset="0"/>
-              </a:rPr>
-              <a:t>σ</a:t>
-            </a:r>
-            <a:r>
-              <a:rPr lang="en-US" sz="2800" baseline="-25000" dirty="0" err="1">
-                <a:latin typeface="Calibri" panose="020F0502020204030204" pitchFamily="34" charset="0"/>
-                <a:cs typeface="Calibri" panose="020F0502020204030204" pitchFamily="34" charset="0"/>
-              </a:rPr>
-              <a:t>hhsize</a:t>
-            </a:r>
-            <a:endParaRPr lang="en-US" sz="2800" dirty="0"/>
-          </a:p>
-        </p:txBody>
-      </p:sp>
-      <p:sp>
-        <p:nvSpPr>
-          <p:cNvPr id="9" name="TextBox 8"/>
-          <p:cNvSpPr txBox="1"/>
-          <p:nvPr/>
-        </p:nvSpPr>
-        <p:spPr>
-          <a:xfrm>
-            <a:off x="8770850" y="2464904"/>
-            <a:ext cx="583096" cy="523220"/>
-          </a:xfrm>
-          <a:prstGeom prst="rect">
-            <a:avLst/>
-          </a:prstGeom>
-          <a:noFill/>
-        </p:spPr>
-        <p:txBody>
-          <a:bodyPr wrap="square" rtlCol="0" anchor="ctr">
-            <a:spAutoFit/>
-          </a:bodyPr>
-          <a:lstStyle/>
-          <a:p>
-            <a:pPr algn="ctr"/>
-            <a:r>
-              <a:rPr lang="en-US" sz="2800" dirty="0"/>
-              <a:t>0</a:t>
-            </a:r>
-          </a:p>
-        </p:txBody>
-      </p:sp>
-      <p:cxnSp>
-        <p:nvCxnSpPr>
-          <p:cNvPr id="10" name="Straight Arrow Connector 9"/>
-          <p:cNvCxnSpPr>
-            <a:stCxn id="8" idx="3"/>
-            <a:endCxn id="9" idx="1"/>
-          </p:cNvCxnSpPr>
-          <p:nvPr/>
-        </p:nvCxnSpPr>
-        <p:spPr>
-          <a:xfrm>
-            <a:off x="8136834" y="2726514"/>
-            <a:ext cx="634016" cy="0"/>
-          </a:xfrm>
-          <a:prstGeom prst="straightConnector1">
-            <a:avLst/>
-          </a:prstGeom>
-          <a:ln w="31750">
-            <a:tailEnd type="triangle" w="med" len="lg"/>
-          </a:ln>
-        </p:spPr>
-        <p:style>
-          <a:lnRef idx="1">
-            <a:schemeClr val="accent1"/>
-          </a:lnRef>
-          <a:fillRef idx="0">
-            <a:schemeClr val="accent1"/>
-          </a:fillRef>
-          <a:effectRef idx="0">
-            <a:schemeClr val="accent1"/>
-          </a:effectRef>
-          <a:fontRef idx="minor">
-            <a:schemeClr val="tx1"/>
-          </a:fontRef>
-        </p:style>
-      </p:cxnSp>
-      <p:sp>
-        <p:nvSpPr>
-          <p:cNvPr id="11" name="TextBox 10"/>
-          <p:cNvSpPr txBox="1"/>
-          <p:nvPr/>
-        </p:nvSpPr>
-        <p:spPr>
-          <a:xfrm>
-            <a:off x="5862553" y="2464904"/>
-            <a:ext cx="583096" cy="523220"/>
-          </a:xfrm>
-          <a:prstGeom prst="rect">
-            <a:avLst/>
-          </a:prstGeom>
-          <a:noFill/>
-        </p:spPr>
-        <p:txBody>
-          <a:bodyPr wrap="square" rtlCol="0" anchor="ctr">
-            <a:spAutoFit/>
-          </a:bodyPr>
-          <a:lstStyle/>
-          <a:p>
-            <a:pPr algn="ctr"/>
-            <a:r>
-              <a:rPr lang="en-US" sz="2800" dirty="0"/>
-              <a:t>as</a:t>
-            </a:r>
-          </a:p>
-        </p:txBody>
-      </p:sp>
-      <p:sp>
-        <p:nvSpPr>
-          <p:cNvPr id="12" name="TextBox 11"/>
-          <p:cNvSpPr txBox="1"/>
-          <p:nvPr/>
-        </p:nvSpPr>
-        <p:spPr>
-          <a:xfrm>
-            <a:off x="2663688" y="3521123"/>
-            <a:ext cx="6980826" cy="1566006"/>
-          </a:xfrm>
-          <a:prstGeom prst="rect">
-            <a:avLst/>
-          </a:prstGeom>
-          <a:noFill/>
-        </p:spPr>
-        <p:txBody>
-          <a:bodyPr wrap="square" rtlCol="0">
-            <a:spAutoFit/>
-          </a:bodyPr>
-          <a:lstStyle/>
-          <a:p>
-            <a:pPr>
-              <a:lnSpc>
-                <a:spcPct val="114000"/>
-              </a:lnSpc>
-            </a:pPr>
-            <a:r>
-              <a:rPr lang="en-US" sz="2800" dirty="0"/>
-              <a:t>Where </a:t>
-            </a:r>
-          </a:p>
-          <a:p>
-            <a:pPr lvl="1">
-              <a:lnSpc>
-                <a:spcPct val="114000"/>
-              </a:lnSpc>
-            </a:pPr>
-            <a:r>
-              <a:rPr lang="en-US" sz="2800" dirty="0" err="1"/>
-              <a:t>pov</a:t>
-            </a:r>
-            <a:r>
-              <a:rPr lang="en-US" sz="2800" dirty="0"/>
-              <a:t> = poverty ratio</a:t>
-            </a:r>
-          </a:p>
-          <a:p>
-            <a:pPr lvl="1">
-              <a:lnSpc>
-                <a:spcPct val="114000"/>
-              </a:lnSpc>
-            </a:pPr>
-            <a:r>
-              <a:rPr lang="en-US" sz="2800" dirty="0" err="1"/>
-              <a:t>hhsize</a:t>
-            </a:r>
-            <a:r>
-              <a:rPr lang="en-US" sz="2800" dirty="0"/>
-              <a:t> = household size</a:t>
-            </a:r>
-          </a:p>
-        </p:txBody>
-      </p:sp>
+        </p:spPr>
+      </p:pic>
     </p:spTree>
     <p:extLst>
       <p:ext uri="{BB962C8B-B14F-4D97-AF65-F5344CB8AC3E}">
-        <p14:creationId xmlns:p14="http://schemas.microsoft.com/office/powerpoint/2010/main" val="3290647572"/>
+        <p14:creationId xmlns:p14="http://schemas.microsoft.com/office/powerpoint/2010/main" val="2956701217"/>
       </p:ext>
     </p:extLst>
   </p:cSld>
@@ -3775,8 +3670,8 @@
         </p:blipFill>
         <p:spPr>
           <a:xfrm>
-            <a:off x="1402079" y="1600200"/>
-            <a:ext cx="9387842" cy="3657600"/>
+            <a:off x="2825755" y="228600"/>
+            <a:ext cx="6540491" cy="6400800"/>
           </a:xfrm>
           <a:prstGeom prst="rect">
             <a:avLst/>
@@ -3786,7 +3681,152 @@
     </p:spTree>
     <p:extLst>
       <p:ext uri="{BB962C8B-B14F-4D97-AF65-F5344CB8AC3E}">
-        <p14:creationId xmlns:p14="http://schemas.microsoft.com/office/powerpoint/2010/main" val="3735095028"/>
+        <p14:creationId xmlns:p14="http://schemas.microsoft.com/office/powerpoint/2010/main" val="2483279243"/>
+      </p:ext>
+    </p:extLst>
+  </p:cSld>
+  <p:clrMapOvr>
+    <a:masterClrMapping/>
+  </p:clrMapOvr>
+</p:sld>
+</file>
+
+<file path=ppt/slides/slide18.xml><?xml version="1.0" encoding="utf-8"?>
+<p:sld xmlns:a="http://schemas.openxmlformats.org/drawingml/2006/main" xmlns:r="http://schemas.openxmlformats.org/officeDocument/2006/relationships" xmlns:p="http://schemas.openxmlformats.org/presentationml/2006/main">
+  <p:cSld>
+    <p:spTree>
+      <p:nvGrpSpPr>
+        <p:cNvPr id="1" name=""/>
+        <p:cNvGrpSpPr/>
+        <p:nvPr/>
+      </p:nvGrpSpPr>
+      <p:grpSpPr>
+        <a:xfrm>
+          <a:off x="0" y="0"/>
+          <a:ext cx="0" cy="0"/>
+          <a:chOff x="0" y="0"/>
+          <a:chExt cx="0" cy="0"/>
+        </a:xfrm>
+      </p:grpSpPr>
+      <p:sp>
+        <p:nvSpPr>
+          <p:cNvPr id="2" name="Title 1"/>
+          <p:cNvSpPr>
+            <a:spLocks noGrp="1"/>
+          </p:cNvSpPr>
+          <p:nvPr>
+            <p:ph type="title"/>
+          </p:nvPr>
+        </p:nvSpPr>
+        <p:spPr/>
+        <p:txBody>
+          <a:bodyPr/>
+          <a:lstStyle/>
+          <a:p>
+            <a:r>
+              <a:rPr lang="en-US" dirty="0"/>
+              <a:t>Questions and Discussion</a:t>
+            </a:r>
+          </a:p>
+        </p:txBody>
+      </p:sp>
+      <p:sp>
+        <p:nvSpPr>
+          <p:cNvPr id="3" name="Text Placeholder 2"/>
+          <p:cNvSpPr>
+            <a:spLocks noGrp="1"/>
+          </p:cNvSpPr>
+          <p:nvPr>
+            <p:ph type="body" idx="1"/>
+          </p:nvPr>
+        </p:nvSpPr>
+        <p:spPr/>
+        <p:txBody>
+          <a:bodyPr/>
+          <a:lstStyle/>
+          <a:p>
+            <a:endParaRPr lang="en-US"/>
+          </a:p>
+        </p:txBody>
+      </p:sp>
+    </p:spTree>
+    <p:extLst>
+      <p:ext uri="{BB962C8B-B14F-4D97-AF65-F5344CB8AC3E}">
+        <p14:creationId xmlns:p14="http://schemas.microsoft.com/office/powerpoint/2010/main" val="3701280497"/>
+      </p:ext>
+    </p:extLst>
+  </p:cSld>
+  <p:clrMapOvr>
+    <a:masterClrMapping/>
+  </p:clrMapOvr>
+</p:sld>
+</file>
+
+<file path=ppt/slides/slide19.xml><?xml version="1.0" encoding="utf-8"?>
+<p:sld xmlns:a="http://schemas.openxmlformats.org/drawingml/2006/main" xmlns:r="http://schemas.openxmlformats.org/officeDocument/2006/relationships" xmlns:p="http://schemas.openxmlformats.org/presentationml/2006/main">
+  <p:cSld>
+    <p:spTree>
+      <p:nvGrpSpPr>
+        <p:cNvPr id="1" name=""/>
+        <p:cNvGrpSpPr/>
+        <p:nvPr/>
+      </p:nvGrpSpPr>
+      <p:grpSpPr>
+        <a:xfrm>
+          <a:off x="0" y="0"/>
+          <a:ext cx="0" cy="0"/>
+          <a:chOff x="0" y="0"/>
+          <a:chExt cx="0" cy="0"/>
+        </a:xfrm>
+      </p:grpSpPr>
+      <p:sp>
+        <p:nvSpPr>
+          <p:cNvPr id="2" name="Title 1"/>
+          <p:cNvSpPr>
+            <a:spLocks noGrp="1"/>
+          </p:cNvSpPr>
+          <p:nvPr>
+            <p:ph type="title"/>
+          </p:nvPr>
+        </p:nvSpPr>
+        <p:spPr/>
+        <p:txBody>
+          <a:bodyPr/>
+          <a:lstStyle/>
+          <a:p>
+            <a:r>
+              <a:rPr lang="en-US" dirty="0"/>
+              <a:t>Appendix</a:t>
+            </a:r>
+          </a:p>
+        </p:txBody>
+      </p:sp>
+      <p:sp>
+        <p:nvSpPr>
+          <p:cNvPr id="3" name="Text Placeholder 2"/>
+          <p:cNvSpPr>
+            <a:spLocks noGrp="1"/>
+          </p:cNvSpPr>
+          <p:nvPr>
+            <p:ph type="body" idx="1"/>
+          </p:nvPr>
+        </p:nvSpPr>
+        <p:spPr/>
+        <p:txBody>
+          <a:bodyPr/>
+          <a:lstStyle/>
+          <a:p>
+            <a:r>
+              <a:rPr lang="en-US" dirty="0"/>
+              <a:t>Supplementary Information</a:t>
+            </a:r>
+          </a:p>
+        </p:txBody>
+      </p:sp>
+    </p:spTree>
+    <p:extLst>
+      <p:ext uri="{BB962C8B-B14F-4D97-AF65-F5344CB8AC3E}">
+        <p14:creationId xmlns:p14="http://schemas.microsoft.com/office/powerpoint/2010/main" val="1005583500"/>
       </p:ext>
     </p:extLst>
   </p:cSld>
@@ -4011,7 +4051,873 @@
 </p:sld>
 </file>
 
+<file path=ppt/slides/slide20.xml><?xml version="1.0" encoding="utf-8"?>
+<p:sld xmlns:a="http://schemas.openxmlformats.org/drawingml/2006/main" xmlns:r="http://schemas.openxmlformats.org/officeDocument/2006/relationships" xmlns:p="http://schemas.openxmlformats.org/presentationml/2006/main">
+  <p:cSld>
+    <p:spTree>
+      <p:nvGrpSpPr>
+        <p:cNvPr id="1" name=""/>
+        <p:cNvGrpSpPr/>
+        <p:nvPr/>
+      </p:nvGrpSpPr>
+      <p:grpSpPr>
+        <a:xfrm>
+          <a:off x="0" y="0"/>
+          <a:ext cx="0" cy="0"/>
+          <a:chOff x="0" y="0"/>
+          <a:chExt cx="0" cy="0"/>
+        </a:xfrm>
+      </p:grpSpPr>
+      <p:sp>
+        <p:nvSpPr>
+          <p:cNvPr id="2" name="TextBox 1"/>
+          <p:cNvSpPr txBox="1"/>
+          <p:nvPr/>
+        </p:nvSpPr>
+        <p:spPr>
+          <a:xfrm>
+            <a:off x="2663688" y="2464904"/>
+            <a:ext cx="1298712" cy="523220"/>
+          </a:xfrm>
+          <a:prstGeom prst="rect">
+            <a:avLst/>
+          </a:prstGeom>
+          <a:noFill/>
+        </p:spPr>
+        <p:txBody>
+          <a:bodyPr wrap="square" rtlCol="0">
+            <a:spAutoFit/>
+          </a:bodyPr>
+          <a:lstStyle/>
+          <a:p>
+            <a:r>
+              <a:rPr lang="el-GR" sz="2800" dirty="0">
+                <a:latin typeface="Calibri" panose="020F0502020204030204" pitchFamily="34" charset="0"/>
+                <a:cs typeface="Calibri" panose="020F0502020204030204" pitchFamily="34" charset="0"/>
+              </a:rPr>
+              <a:t>ρ</a:t>
+            </a:r>
+            <a:r>
+              <a:rPr lang="en-US" sz="2800" baseline="-25000" dirty="0" err="1">
+                <a:latin typeface="Calibri" panose="020F0502020204030204" pitchFamily="34" charset="0"/>
+                <a:cs typeface="Calibri" panose="020F0502020204030204" pitchFamily="34" charset="0"/>
+              </a:rPr>
+              <a:t>pov|mhi</a:t>
+            </a:r>
+            <a:endParaRPr lang="en-US" sz="2800" dirty="0"/>
+          </a:p>
+        </p:txBody>
+      </p:sp>
+      <p:sp>
+        <p:nvSpPr>
+          <p:cNvPr id="5" name="TextBox 4"/>
+          <p:cNvSpPr txBox="1"/>
+          <p:nvPr/>
+        </p:nvSpPr>
+        <p:spPr>
+          <a:xfrm>
+            <a:off x="4598900" y="2464904"/>
+            <a:ext cx="583096" cy="523220"/>
+          </a:xfrm>
+          <a:prstGeom prst="rect">
+            <a:avLst/>
+          </a:prstGeom>
+          <a:noFill/>
+        </p:spPr>
+        <p:txBody>
+          <a:bodyPr wrap="square" rtlCol="0" anchor="ctr">
+            <a:spAutoFit/>
+          </a:bodyPr>
+          <a:lstStyle/>
+          <a:p>
+            <a:pPr algn="ctr"/>
+            <a:r>
+              <a:rPr lang="en-US" sz="2800" dirty="0"/>
+              <a:t>1</a:t>
+            </a:r>
+          </a:p>
+        </p:txBody>
+      </p:sp>
+      <p:cxnSp>
+        <p:nvCxnSpPr>
+          <p:cNvPr id="7" name="Straight Arrow Connector 6"/>
+          <p:cNvCxnSpPr>
+            <a:stCxn id="2" idx="3"/>
+            <a:endCxn id="5" idx="1"/>
+          </p:cNvCxnSpPr>
+          <p:nvPr/>
+        </p:nvCxnSpPr>
+        <p:spPr>
+          <a:xfrm>
+            <a:off x="3962400" y="2726514"/>
+            <a:ext cx="636500" cy="0"/>
+          </a:xfrm>
+          <a:prstGeom prst="straightConnector1">
+            <a:avLst/>
+          </a:prstGeom>
+          <a:ln w="31750">
+            <a:tailEnd type="triangle" w="med" len="lg"/>
+          </a:ln>
+        </p:spPr>
+        <p:style>
+          <a:lnRef idx="1">
+            <a:schemeClr val="accent1"/>
+          </a:lnRef>
+          <a:fillRef idx="0">
+            <a:schemeClr val="accent1"/>
+          </a:fillRef>
+          <a:effectRef idx="0">
+            <a:schemeClr val="accent1"/>
+          </a:effectRef>
+          <a:fontRef idx="minor">
+            <a:schemeClr val="tx1"/>
+          </a:fontRef>
+        </p:style>
+      </p:cxnSp>
+      <p:sp>
+        <p:nvSpPr>
+          <p:cNvPr id="8" name="TextBox 7"/>
+          <p:cNvSpPr txBox="1"/>
+          <p:nvPr/>
+        </p:nvSpPr>
+        <p:spPr>
+          <a:xfrm>
+            <a:off x="7139853" y="2464904"/>
+            <a:ext cx="996981" cy="523220"/>
+          </a:xfrm>
+          <a:prstGeom prst="rect">
+            <a:avLst/>
+          </a:prstGeom>
+          <a:noFill/>
+        </p:spPr>
+        <p:txBody>
+          <a:bodyPr wrap="square" rtlCol="0">
+            <a:spAutoFit/>
+          </a:bodyPr>
+          <a:lstStyle/>
+          <a:p>
+            <a:r>
+              <a:rPr lang="el-GR" sz="2800" dirty="0">
+                <a:latin typeface="Calibri" panose="020F0502020204030204" pitchFamily="34" charset="0"/>
+                <a:cs typeface="Calibri" panose="020F0502020204030204" pitchFamily="34" charset="0"/>
+              </a:rPr>
+              <a:t>σ</a:t>
+            </a:r>
+            <a:r>
+              <a:rPr lang="en-US" sz="2800" baseline="-25000" dirty="0" err="1">
+                <a:latin typeface="Calibri" panose="020F0502020204030204" pitchFamily="34" charset="0"/>
+                <a:cs typeface="Calibri" panose="020F0502020204030204" pitchFamily="34" charset="0"/>
+              </a:rPr>
+              <a:t>hhsize</a:t>
+            </a:r>
+            <a:endParaRPr lang="en-US" sz="2800" dirty="0"/>
+          </a:p>
+        </p:txBody>
+      </p:sp>
+      <p:sp>
+        <p:nvSpPr>
+          <p:cNvPr id="9" name="TextBox 8"/>
+          <p:cNvSpPr txBox="1"/>
+          <p:nvPr/>
+        </p:nvSpPr>
+        <p:spPr>
+          <a:xfrm>
+            <a:off x="8770850" y="2464904"/>
+            <a:ext cx="583096" cy="523220"/>
+          </a:xfrm>
+          <a:prstGeom prst="rect">
+            <a:avLst/>
+          </a:prstGeom>
+          <a:noFill/>
+        </p:spPr>
+        <p:txBody>
+          <a:bodyPr wrap="square" rtlCol="0" anchor="ctr">
+            <a:spAutoFit/>
+          </a:bodyPr>
+          <a:lstStyle/>
+          <a:p>
+            <a:pPr algn="ctr"/>
+            <a:r>
+              <a:rPr lang="en-US" sz="2800" dirty="0"/>
+              <a:t>0</a:t>
+            </a:r>
+          </a:p>
+        </p:txBody>
+      </p:sp>
+      <p:cxnSp>
+        <p:nvCxnSpPr>
+          <p:cNvPr id="10" name="Straight Arrow Connector 9"/>
+          <p:cNvCxnSpPr>
+            <a:stCxn id="8" idx="3"/>
+            <a:endCxn id="9" idx="1"/>
+          </p:cNvCxnSpPr>
+          <p:nvPr/>
+        </p:nvCxnSpPr>
+        <p:spPr>
+          <a:xfrm>
+            <a:off x="8136834" y="2726514"/>
+            <a:ext cx="634016" cy="0"/>
+          </a:xfrm>
+          <a:prstGeom prst="straightConnector1">
+            <a:avLst/>
+          </a:prstGeom>
+          <a:ln w="31750">
+            <a:tailEnd type="triangle" w="med" len="lg"/>
+          </a:ln>
+        </p:spPr>
+        <p:style>
+          <a:lnRef idx="1">
+            <a:schemeClr val="accent1"/>
+          </a:lnRef>
+          <a:fillRef idx="0">
+            <a:schemeClr val="accent1"/>
+          </a:fillRef>
+          <a:effectRef idx="0">
+            <a:schemeClr val="accent1"/>
+          </a:effectRef>
+          <a:fontRef idx="minor">
+            <a:schemeClr val="tx1"/>
+          </a:fontRef>
+        </p:style>
+      </p:cxnSp>
+      <p:sp>
+        <p:nvSpPr>
+          <p:cNvPr id="11" name="TextBox 10"/>
+          <p:cNvSpPr txBox="1"/>
+          <p:nvPr/>
+        </p:nvSpPr>
+        <p:spPr>
+          <a:xfrm>
+            <a:off x="5862553" y="2464904"/>
+            <a:ext cx="583096" cy="523220"/>
+          </a:xfrm>
+          <a:prstGeom prst="rect">
+            <a:avLst/>
+          </a:prstGeom>
+          <a:noFill/>
+        </p:spPr>
+        <p:txBody>
+          <a:bodyPr wrap="square" rtlCol="0" anchor="ctr">
+            <a:spAutoFit/>
+          </a:bodyPr>
+          <a:lstStyle/>
+          <a:p>
+            <a:pPr algn="ctr"/>
+            <a:r>
+              <a:rPr lang="en-US" sz="2800" dirty="0"/>
+              <a:t>as</a:t>
+            </a:r>
+          </a:p>
+        </p:txBody>
+      </p:sp>
+      <p:sp>
+        <p:nvSpPr>
+          <p:cNvPr id="12" name="TextBox 11"/>
+          <p:cNvSpPr txBox="1"/>
+          <p:nvPr/>
+        </p:nvSpPr>
+        <p:spPr>
+          <a:xfrm>
+            <a:off x="2663688" y="3521123"/>
+            <a:ext cx="6980826" cy="1566006"/>
+          </a:xfrm>
+          <a:prstGeom prst="rect">
+            <a:avLst/>
+          </a:prstGeom>
+          <a:noFill/>
+        </p:spPr>
+        <p:txBody>
+          <a:bodyPr wrap="square" rtlCol="0">
+            <a:spAutoFit/>
+          </a:bodyPr>
+          <a:lstStyle/>
+          <a:p>
+            <a:pPr>
+              <a:lnSpc>
+                <a:spcPct val="114000"/>
+              </a:lnSpc>
+            </a:pPr>
+            <a:r>
+              <a:rPr lang="en-US" sz="2800" dirty="0"/>
+              <a:t>Where </a:t>
+            </a:r>
+          </a:p>
+          <a:p>
+            <a:pPr lvl="1">
+              <a:lnSpc>
+                <a:spcPct val="114000"/>
+              </a:lnSpc>
+            </a:pPr>
+            <a:r>
+              <a:rPr lang="en-US" sz="2800" dirty="0" err="1"/>
+              <a:t>pov</a:t>
+            </a:r>
+            <a:r>
+              <a:rPr lang="en-US" sz="2800" dirty="0"/>
+              <a:t> = poverty ratio</a:t>
+            </a:r>
+          </a:p>
+          <a:p>
+            <a:pPr lvl="1">
+              <a:lnSpc>
+                <a:spcPct val="114000"/>
+              </a:lnSpc>
+            </a:pPr>
+            <a:r>
+              <a:rPr lang="en-US" sz="2800" dirty="0" err="1"/>
+              <a:t>hhsize</a:t>
+            </a:r>
+            <a:r>
+              <a:rPr lang="en-US" sz="2800" dirty="0"/>
+              <a:t> = household size</a:t>
+            </a:r>
+          </a:p>
+        </p:txBody>
+      </p:sp>
+    </p:spTree>
+    <p:extLst>
+      <p:ext uri="{BB962C8B-B14F-4D97-AF65-F5344CB8AC3E}">
+        <p14:creationId xmlns:p14="http://schemas.microsoft.com/office/powerpoint/2010/main" val="3290647572"/>
+      </p:ext>
+    </p:extLst>
+  </p:cSld>
+  <p:clrMapOvr>
+    <a:masterClrMapping/>
+  </p:clrMapOvr>
+</p:sld>
+</file>
+
 <file path=ppt/slides/slide3.xml><?xml version="1.0" encoding="utf-8"?>
+<p:sld xmlns:a="http://schemas.openxmlformats.org/drawingml/2006/main" xmlns:r="http://schemas.openxmlformats.org/officeDocument/2006/relationships" xmlns:p="http://schemas.openxmlformats.org/presentationml/2006/main">
+  <p:cSld>
+    <p:spTree>
+      <p:nvGrpSpPr>
+        <p:cNvPr id="1" name=""/>
+        <p:cNvGrpSpPr/>
+        <p:nvPr/>
+      </p:nvGrpSpPr>
+      <p:grpSpPr>
+        <a:xfrm>
+          <a:off x="0" y="0"/>
+          <a:ext cx="0" cy="0"/>
+          <a:chOff x="0" y="0"/>
+          <a:chExt cx="0" cy="0"/>
+        </a:xfrm>
+      </p:grpSpPr>
+      <p:sp>
+        <p:nvSpPr>
+          <p:cNvPr id="2" name="TextBox 1"/>
+          <p:cNvSpPr txBox="1"/>
+          <p:nvPr/>
+        </p:nvSpPr>
+        <p:spPr>
+          <a:xfrm>
+            <a:off x="1258957" y="834893"/>
+            <a:ext cx="10151165" cy="523220"/>
+          </a:xfrm>
+          <a:prstGeom prst="rect">
+            <a:avLst/>
+          </a:prstGeom>
+          <a:noFill/>
+        </p:spPr>
+        <p:txBody>
+          <a:bodyPr wrap="square" rtlCol="0">
+            <a:spAutoFit/>
+          </a:bodyPr>
+          <a:lstStyle/>
+          <a:p>
+            <a:r>
+              <a:rPr lang="en-US" sz="2800" b="1" dirty="0"/>
+              <a:t>Research Question</a:t>
+            </a:r>
+          </a:p>
+        </p:txBody>
+      </p:sp>
+      <p:sp>
+        <p:nvSpPr>
+          <p:cNvPr id="3" name="TextBox 2"/>
+          <p:cNvSpPr txBox="1"/>
+          <p:nvPr/>
+        </p:nvSpPr>
+        <p:spPr>
+          <a:xfrm>
+            <a:off x="1258956" y="1452226"/>
+            <a:ext cx="8998226" cy="707886"/>
+          </a:xfrm>
+          <a:prstGeom prst="rect">
+            <a:avLst/>
+          </a:prstGeom>
+          <a:noFill/>
+        </p:spPr>
+        <p:txBody>
+          <a:bodyPr wrap="square" rtlCol="0">
+            <a:spAutoFit/>
+          </a:bodyPr>
+          <a:lstStyle/>
+          <a:p>
+            <a:r>
+              <a:rPr lang="en-US" sz="2000" dirty="0"/>
+              <a:t>Is there a statistically significant association between poverty and race when controlling for certain factors including potential spatial processes?</a:t>
+            </a:r>
+          </a:p>
+        </p:txBody>
+      </p:sp>
+      <p:sp>
+        <p:nvSpPr>
+          <p:cNvPr id="4" name="TextBox 3"/>
+          <p:cNvSpPr txBox="1"/>
+          <p:nvPr/>
+        </p:nvSpPr>
+        <p:spPr>
+          <a:xfrm>
+            <a:off x="2358886" y="3340264"/>
+            <a:ext cx="8229600" cy="1015663"/>
+          </a:xfrm>
+          <a:prstGeom prst="rect">
+            <a:avLst/>
+          </a:prstGeom>
+          <a:noFill/>
+        </p:spPr>
+        <p:txBody>
+          <a:bodyPr wrap="square" rtlCol="0">
+            <a:spAutoFit/>
+          </a:bodyPr>
+          <a:lstStyle/>
+          <a:p>
+            <a:r>
+              <a:rPr lang="en-US" sz="2000" dirty="0"/>
+              <a:t>There a positive association between poverty and the Black population ratio when controlling for certain factors including potential spatial processes.</a:t>
+            </a:r>
+          </a:p>
+        </p:txBody>
+      </p:sp>
+      <p:sp>
+        <p:nvSpPr>
+          <p:cNvPr id="6" name="TextBox 5"/>
+          <p:cNvSpPr txBox="1"/>
+          <p:nvPr/>
+        </p:nvSpPr>
+        <p:spPr>
+          <a:xfrm>
+            <a:off x="1258956" y="2690434"/>
+            <a:ext cx="10151165" cy="523220"/>
+          </a:xfrm>
+          <a:prstGeom prst="rect">
+            <a:avLst/>
+          </a:prstGeom>
+          <a:noFill/>
+        </p:spPr>
+        <p:txBody>
+          <a:bodyPr wrap="square" rtlCol="0">
+            <a:spAutoFit/>
+          </a:bodyPr>
+          <a:lstStyle/>
+          <a:p>
+            <a:r>
+              <a:rPr lang="en-US" sz="2800" b="1" dirty="0"/>
+              <a:t>Hypothesis</a:t>
+            </a:r>
+          </a:p>
+        </p:txBody>
+      </p:sp>
+      <p:sp>
+        <p:nvSpPr>
+          <p:cNvPr id="7" name="TextBox 6"/>
+          <p:cNvSpPr txBox="1"/>
+          <p:nvPr/>
+        </p:nvSpPr>
+        <p:spPr>
+          <a:xfrm>
+            <a:off x="2358886" y="4593865"/>
+            <a:ext cx="8229600" cy="1015663"/>
+          </a:xfrm>
+          <a:prstGeom prst="rect">
+            <a:avLst/>
+          </a:prstGeom>
+          <a:noFill/>
+        </p:spPr>
+        <p:txBody>
+          <a:bodyPr wrap="square" rtlCol="0">
+            <a:spAutoFit/>
+          </a:bodyPr>
+          <a:lstStyle/>
+          <a:p>
+            <a:r>
+              <a:rPr lang="en-US" sz="2000" dirty="0"/>
+              <a:t>The association between poverty and the Black population ratio is greater than the association between poverty and the White population ratio when controlling for certain factors including potential spatial processes.</a:t>
+            </a:r>
+          </a:p>
+        </p:txBody>
+      </p:sp>
+      <p:sp>
+        <p:nvSpPr>
+          <p:cNvPr id="8" name="TextBox 7"/>
+          <p:cNvSpPr txBox="1"/>
+          <p:nvPr/>
+        </p:nvSpPr>
+        <p:spPr>
+          <a:xfrm>
+            <a:off x="1577009" y="3340264"/>
+            <a:ext cx="781878" cy="523220"/>
+          </a:xfrm>
+          <a:prstGeom prst="rect">
+            <a:avLst/>
+          </a:prstGeom>
+          <a:noFill/>
+        </p:spPr>
+        <p:txBody>
+          <a:bodyPr wrap="square" rtlCol="0">
+            <a:spAutoFit/>
+          </a:bodyPr>
+          <a:lstStyle/>
+          <a:p>
+            <a:r>
+              <a:rPr lang="en-US" sz="2800" dirty="0"/>
+              <a:t>H</a:t>
+            </a:r>
+            <a:r>
+              <a:rPr lang="en-US" sz="2800" baseline="-25000" dirty="0"/>
+              <a:t>1</a:t>
+            </a:r>
+          </a:p>
+        </p:txBody>
+      </p:sp>
+      <p:sp>
+        <p:nvSpPr>
+          <p:cNvPr id="9" name="TextBox 8"/>
+          <p:cNvSpPr txBox="1"/>
+          <p:nvPr/>
+        </p:nvSpPr>
+        <p:spPr>
+          <a:xfrm>
+            <a:off x="1563754" y="4593865"/>
+            <a:ext cx="781878" cy="523220"/>
+          </a:xfrm>
+          <a:prstGeom prst="rect">
+            <a:avLst/>
+          </a:prstGeom>
+          <a:noFill/>
+        </p:spPr>
+        <p:txBody>
+          <a:bodyPr wrap="square" rtlCol="0">
+            <a:spAutoFit/>
+          </a:bodyPr>
+          <a:lstStyle/>
+          <a:p>
+            <a:r>
+              <a:rPr lang="en-US" sz="2800" dirty="0"/>
+              <a:t>H</a:t>
+            </a:r>
+            <a:r>
+              <a:rPr lang="en-US" sz="2800" baseline="-25000" dirty="0"/>
+              <a:t>2</a:t>
+            </a:r>
+          </a:p>
+        </p:txBody>
+      </p:sp>
+    </p:spTree>
+    <p:extLst>
+      <p:ext uri="{BB962C8B-B14F-4D97-AF65-F5344CB8AC3E}">
+        <p14:creationId xmlns:p14="http://schemas.microsoft.com/office/powerpoint/2010/main" val="1935302482"/>
+      </p:ext>
+    </p:extLst>
+  </p:cSld>
+  <p:clrMapOvr>
+    <a:masterClrMapping/>
+  </p:clrMapOvr>
+</p:sld>
+</file>
+
+<file path=ppt/slides/slide4.xml><?xml version="1.0" encoding="utf-8"?>
+<p:sld xmlns:a="http://schemas.openxmlformats.org/drawingml/2006/main" xmlns:r="http://schemas.openxmlformats.org/officeDocument/2006/relationships" xmlns:p="http://schemas.openxmlformats.org/presentationml/2006/main">
+  <p:cSld>
+    <p:spTree>
+      <p:nvGrpSpPr>
+        <p:cNvPr id="1" name=""/>
+        <p:cNvGrpSpPr/>
+        <p:nvPr/>
+      </p:nvGrpSpPr>
+      <p:grpSpPr>
+        <a:xfrm>
+          <a:off x="0" y="0"/>
+          <a:ext cx="0" cy="0"/>
+          <a:chOff x="0" y="0"/>
+          <a:chExt cx="0" cy="0"/>
+        </a:xfrm>
+      </p:grpSpPr>
+      <p:sp>
+        <p:nvSpPr>
+          <p:cNvPr id="2" name="TextBox 1"/>
+          <p:cNvSpPr txBox="1"/>
+          <p:nvPr/>
+        </p:nvSpPr>
+        <p:spPr>
+          <a:xfrm>
+            <a:off x="1258958" y="834893"/>
+            <a:ext cx="4147930" cy="523220"/>
+          </a:xfrm>
+          <a:prstGeom prst="rect">
+            <a:avLst/>
+          </a:prstGeom>
+          <a:noFill/>
+        </p:spPr>
+        <p:txBody>
+          <a:bodyPr wrap="square" rtlCol="0">
+            <a:spAutoFit/>
+          </a:bodyPr>
+          <a:lstStyle/>
+          <a:p>
+            <a:r>
+              <a:rPr lang="en-US" sz="2800" b="1" dirty="0"/>
+              <a:t>Dependent Variable</a:t>
+            </a:r>
+          </a:p>
+        </p:txBody>
+      </p:sp>
+      <p:sp>
+        <p:nvSpPr>
+          <p:cNvPr id="3" name="TextBox 2"/>
+          <p:cNvSpPr txBox="1"/>
+          <p:nvPr/>
+        </p:nvSpPr>
+        <p:spPr>
+          <a:xfrm>
+            <a:off x="1258956" y="1452226"/>
+            <a:ext cx="4147932" cy="400110"/>
+          </a:xfrm>
+          <a:prstGeom prst="rect">
+            <a:avLst/>
+          </a:prstGeom>
+          <a:noFill/>
+        </p:spPr>
+        <p:txBody>
+          <a:bodyPr wrap="square" rtlCol="0">
+            <a:spAutoFit/>
+          </a:bodyPr>
+          <a:lstStyle/>
+          <a:p>
+            <a:r>
+              <a:rPr lang="en-US" sz="2000" dirty="0"/>
+              <a:t>Poverty ratio</a:t>
+            </a:r>
+          </a:p>
+        </p:txBody>
+      </p:sp>
+      <p:sp>
+        <p:nvSpPr>
+          <p:cNvPr id="4" name="TextBox 3"/>
+          <p:cNvSpPr txBox="1"/>
+          <p:nvPr/>
+        </p:nvSpPr>
+        <p:spPr>
+          <a:xfrm>
+            <a:off x="1258956" y="3232547"/>
+            <a:ext cx="4147932" cy="2400657"/>
+          </a:xfrm>
+          <a:prstGeom prst="rect">
+            <a:avLst/>
+          </a:prstGeom>
+          <a:noFill/>
+        </p:spPr>
+        <p:txBody>
+          <a:bodyPr wrap="square" rtlCol="0">
+            <a:spAutoFit/>
+          </a:bodyPr>
+          <a:lstStyle/>
+          <a:p>
+            <a:pPr>
+              <a:lnSpc>
+                <a:spcPct val="150000"/>
+              </a:lnSpc>
+            </a:pPr>
+            <a:r>
+              <a:rPr lang="en-US" sz="2000" dirty="0"/>
+              <a:t>Black population ratio</a:t>
+            </a:r>
+          </a:p>
+          <a:p>
+            <a:pPr>
+              <a:lnSpc>
+                <a:spcPct val="150000"/>
+              </a:lnSpc>
+            </a:pPr>
+            <a:r>
+              <a:rPr lang="en-US" sz="2000" dirty="0"/>
+              <a:t>White population ratio</a:t>
+            </a:r>
+          </a:p>
+          <a:p>
+            <a:pPr>
+              <a:lnSpc>
+                <a:spcPct val="150000"/>
+              </a:lnSpc>
+            </a:pPr>
+            <a:r>
+              <a:rPr lang="en-US" sz="2000" dirty="0"/>
+              <a:t>Education attainment</a:t>
+            </a:r>
+          </a:p>
+          <a:p>
+            <a:pPr>
+              <a:lnSpc>
+                <a:spcPct val="150000"/>
+              </a:lnSpc>
+            </a:pPr>
+            <a:r>
+              <a:rPr lang="en-US" sz="2000" dirty="0"/>
+              <a:t>Median household income</a:t>
+            </a:r>
+          </a:p>
+          <a:p>
+            <a:pPr>
+              <a:lnSpc>
+                <a:spcPct val="150000"/>
+              </a:lnSpc>
+            </a:pPr>
+            <a:r>
+              <a:rPr lang="en-US" sz="2000" dirty="0"/>
+              <a:t>Population density</a:t>
+            </a:r>
+          </a:p>
+        </p:txBody>
+      </p:sp>
+      <p:sp>
+        <p:nvSpPr>
+          <p:cNvPr id="6" name="TextBox 5"/>
+          <p:cNvSpPr txBox="1"/>
+          <p:nvPr/>
+        </p:nvSpPr>
+        <p:spPr>
+          <a:xfrm>
+            <a:off x="1258957" y="2690434"/>
+            <a:ext cx="4147932" cy="523220"/>
+          </a:xfrm>
+          <a:prstGeom prst="rect">
+            <a:avLst/>
+          </a:prstGeom>
+          <a:noFill/>
+        </p:spPr>
+        <p:txBody>
+          <a:bodyPr wrap="square" rtlCol="0">
+            <a:spAutoFit/>
+          </a:bodyPr>
+          <a:lstStyle/>
+          <a:p>
+            <a:r>
+              <a:rPr lang="en-US" sz="2800" b="1" dirty="0"/>
+              <a:t>Independent Variables</a:t>
+            </a:r>
+          </a:p>
+        </p:txBody>
+      </p:sp>
+      <p:sp>
+        <p:nvSpPr>
+          <p:cNvPr id="10" name="TextBox 9"/>
+          <p:cNvSpPr txBox="1"/>
+          <p:nvPr/>
+        </p:nvSpPr>
+        <p:spPr>
+          <a:xfrm>
+            <a:off x="6142385" y="834893"/>
+            <a:ext cx="5486400" cy="523220"/>
+          </a:xfrm>
+          <a:prstGeom prst="rect">
+            <a:avLst/>
+          </a:prstGeom>
+          <a:noFill/>
+        </p:spPr>
+        <p:txBody>
+          <a:bodyPr wrap="square" rtlCol="0">
+            <a:spAutoFit/>
+          </a:bodyPr>
+          <a:lstStyle/>
+          <a:p>
+            <a:r>
+              <a:rPr lang="en-US" sz="2800" b="1" dirty="0"/>
+              <a:t>Data</a:t>
+            </a:r>
+          </a:p>
+        </p:txBody>
+      </p:sp>
+      <p:sp>
+        <p:nvSpPr>
+          <p:cNvPr id="11" name="TextBox 10"/>
+          <p:cNvSpPr txBox="1"/>
+          <p:nvPr/>
+        </p:nvSpPr>
+        <p:spPr>
+          <a:xfrm>
+            <a:off x="6142385" y="1452226"/>
+            <a:ext cx="5486400" cy="2862322"/>
+          </a:xfrm>
+          <a:prstGeom prst="rect">
+            <a:avLst/>
+          </a:prstGeom>
+          <a:noFill/>
+        </p:spPr>
+        <p:txBody>
+          <a:bodyPr wrap="square" rtlCol="0">
+            <a:spAutoFit/>
+          </a:bodyPr>
+          <a:lstStyle/>
+          <a:p>
+            <a:r>
+              <a:rPr lang="en-US" sz="2000" dirty="0"/>
+              <a:t>American Community Survey (ACS)</a:t>
+            </a:r>
+          </a:p>
+          <a:p>
+            <a:r>
+              <a:rPr lang="en-US" sz="2000" dirty="0"/>
+              <a:t>2014-2018 5-year estimates</a:t>
+            </a:r>
+          </a:p>
+          <a:p>
+            <a:endParaRPr lang="en-US" sz="2000" dirty="0"/>
+          </a:p>
+          <a:p>
+            <a:r>
+              <a:rPr lang="en-US" sz="2000" dirty="0"/>
+              <a:t>SocialExplorer.com</a:t>
+            </a:r>
+          </a:p>
+          <a:p>
+            <a:endParaRPr lang="en-US" sz="2000" dirty="0"/>
+          </a:p>
+          <a:p>
+            <a:r>
+              <a:rPr lang="en-US" sz="2000" dirty="0"/>
+              <a:t>U.S. Census Bureau</a:t>
+            </a:r>
+          </a:p>
+          <a:p>
+            <a:r>
+              <a:rPr lang="en-US" sz="2000" dirty="0"/>
+              <a:t>TIGER/line shapefile database of the</a:t>
+            </a:r>
+          </a:p>
+          <a:p>
+            <a:r>
+              <a:rPr lang="en-US" sz="2000" dirty="0"/>
+              <a:t>metropolitan and micropolitan statistical areas (MSAs) for the United States </a:t>
+            </a:r>
+          </a:p>
+        </p:txBody>
+      </p:sp>
+    </p:spTree>
+    <p:extLst>
+      <p:ext uri="{BB962C8B-B14F-4D97-AF65-F5344CB8AC3E}">
+        <p14:creationId xmlns:p14="http://schemas.microsoft.com/office/powerpoint/2010/main" val="3591945833"/>
+      </p:ext>
+    </p:extLst>
+  </p:cSld>
+  <p:clrMapOvr>
+    <a:masterClrMapping/>
+  </p:clrMapOvr>
+</p:sld>
+</file>
+
+<file path=ppt/slides/slide5.xml><?xml version="1.0" encoding="utf-8"?>
 <p:sld xmlns:a="http://schemas.openxmlformats.org/drawingml/2006/main" xmlns:r="http://schemas.openxmlformats.org/officeDocument/2006/relationships" xmlns:p="http://schemas.openxmlformats.org/presentationml/2006/main">
   <p:cSld>
     <p:spTree>
@@ -4095,7 +5001,7 @@
 </p:sld>
 </file>
 
-<file path=ppt/slides/slide4.xml><?xml version="1.0" encoding="utf-8"?>
+<file path=ppt/slides/slide6.xml><?xml version="1.0" encoding="utf-8"?>
 <p:sld xmlns:a="http://schemas.openxmlformats.org/drawingml/2006/main" xmlns:r="http://schemas.openxmlformats.org/officeDocument/2006/relationships" xmlns:p="http://schemas.openxmlformats.org/presentationml/2006/main">
   <p:cSld>
     <p:spTree>
@@ -4176,150 +5082,6 @@
     <p:extLst>
       <p:ext uri="{BB962C8B-B14F-4D97-AF65-F5344CB8AC3E}">
         <p14:creationId xmlns:p14="http://schemas.microsoft.com/office/powerpoint/2010/main" val="2711733018"/>
-      </p:ext>
-    </p:extLst>
-  </p:cSld>
-  <p:clrMapOvr>
-    <a:masterClrMapping/>
-  </p:clrMapOvr>
-</p:sld>
-</file>
-
-<file path=ppt/slides/slide5.xml><?xml version="1.0" encoding="utf-8"?>
-<p:sld xmlns:a="http://schemas.openxmlformats.org/drawingml/2006/main" xmlns:r="http://schemas.openxmlformats.org/officeDocument/2006/relationships" xmlns:p="http://schemas.openxmlformats.org/presentationml/2006/main">
-  <p:cSld>
-    <p:spTree>
-      <p:nvGrpSpPr>
-        <p:cNvPr id="1" name=""/>
-        <p:cNvGrpSpPr/>
-        <p:nvPr/>
-      </p:nvGrpSpPr>
-      <p:grpSpPr>
-        <a:xfrm>
-          <a:off x="0" y="0"/>
-          <a:ext cx="0" cy="0"/>
-          <a:chOff x="0" y="0"/>
-          <a:chExt cx="0" cy="0"/>
-        </a:xfrm>
-      </p:grpSpPr>
-      <p:pic>
-        <p:nvPicPr>
-          <p:cNvPr id="2" name="Picture 1"/>
-          <p:cNvPicPr>
-            <a:picLocks noChangeAspect="1"/>
-          </p:cNvPicPr>
-          <p:nvPr/>
-        </p:nvPicPr>
-        <p:blipFill>
-          <a:blip r:embed="rId2">
-            <a:extLst>
-              <a:ext uri="{28A0092B-C50C-407E-A947-70E740481C1C}">
-                <a14:useLocalDpi xmlns:a14="http://schemas.microsoft.com/office/drawing/2010/main" val="0"/>
-              </a:ext>
-            </a:extLst>
-          </a:blip>
-          <a:stretch>
-            <a:fillRect/>
-          </a:stretch>
-        </p:blipFill>
-        <p:spPr>
-          <a:xfrm>
-            <a:off x="457200" y="0"/>
-            <a:ext cx="5299363" cy="6858000"/>
-          </a:xfrm>
-          <a:prstGeom prst="rect">
-            <a:avLst/>
-          </a:prstGeom>
-        </p:spPr>
-      </p:pic>
-      <p:pic>
-        <p:nvPicPr>
-          <p:cNvPr id="4" name="Picture 3"/>
-          <p:cNvPicPr>
-            <a:picLocks noChangeAspect="1"/>
-          </p:cNvPicPr>
-          <p:nvPr/>
-        </p:nvPicPr>
-        <p:blipFill>
-          <a:blip r:embed="rId3">
-            <a:extLst>
-              <a:ext uri="{28A0092B-C50C-407E-A947-70E740481C1C}">
-                <a14:useLocalDpi xmlns:a14="http://schemas.microsoft.com/office/drawing/2010/main" val="0"/>
-              </a:ext>
-            </a:extLst>
-          </a:blip>
-          <a:stretch>
-            <a:fillRect/>
-          </a:stretch>
-        </p:blipFill>
-        <p:spPr>
-          <a:xfrm>
-            <a:off x="6400800" y="0"/>
-            <a:ext cx="5299363" cy="6858000"/>
-          </a:xfrm>
-          <a:prstGeom prst="rect">
-            <a:avLst/>
-          </a:prstGeom>
-        </p:spPr>
-      </p:pic>
-    </p:spTree>
-    <p:extLst>
-      <p:ext uri="{BB962C8B-B14F-4D97-AF65-F5344CB8AC3E}">
-        <p14:creationId xmlns:p14="http://schemas.microsoft.com/office/powerpoint/2010/main" val="3994518001"/>
-      </p:ext>
-    </p:extLst>
-  </p:cSld>
-  <p:clrMapOvr>
-    <a:masterClrMapping/>
-  </p:clrMapOvr>
-</p:sld>
-</file>
-
-<file path=ppt/slides/slide6.xml><?xml version="1.0" encoding="utf-8"?>
-<p:sld xmlns:a="http://schemas.openxmlformats.org/drawingml/2006/main" xmlns:r="http://schemas.openxmlformats.org/officeDocument/2006/relationships" xmlns:p="http://schemas.openxmlformats.org/presentationml/2006/main">
-  <p:cSld>
-    <p:spTree>
-      <p:nvGrpSpPr>
-        <p:cNvPr id="1" name=""/>
-        <p:cNvGrpSpPr/>
-        <p:nvPr/>
-      </p:nvGrpSpPr>
-      <p:grpSpPr>
-        <a:xfrm>
-          <a:off x="0" y="0"/>
-          <a:ext cx="0" cy="0"/>
-          <a:chOff x="0" y="0"/>
-          <a:chExt cx="0" cy="0"/>
-        </a:xfrm>
-      </p:grpSpPr>
-      <p:pic>
-        <p:nvPicPr>
-          <p:cNvPr id="4" name="Picture 3"/>
-          <p:cNvPicPr>
-            <a:picLocks noChangeAspect="1"/>
-          </p:cNvPicPr>
-          <p:nvPr/>
-        </p:nvPicPr>
-        <p:blipFill>
-          <a:blip r:embed="rId2"/>
-          <a:stretch>
-            <a:fillRect/>
-          </a:stretch>
-        </p:blipFill>
-        <p:spPr>
-          <a:xfrm>
-            <a:off x="2575472" y="1828800"/>
-            <a:ext cx="7041057" cy="3200400"/>
-          </a:xfrm>
-          <a:prstGeom prst="rect">
-            <a:avLst/>
-          </a:prstGeom>
-        </p:spPr>
-      </p:pic>
-    </p:spTree>
-    <p:extLst>
-      <p:ext uri="{BB962C8B-B14F-4D97-AF65-F5344CB8AC3E}">
-        <p14:creationId xmlns:p14="http://schemas.microsoft.com/office/powerpoint/2010/main" val="47398568"/>
       </p:ext>
     </p:extLst>
   </p:cSld>
@@ -4368,47 +5130,48 @@
         </p:blipFill>
         <p:spPr>
           <a:xfrm>
-            <a:off x="1168046" y="849699"/>
-            <a:ext cx="9855909" cy="5029200"/>
+            <a:off x="457200" y="0"/>
+            <a:ext cx="5299363" cy="6858000"/>
           </a:xfrm>
           <a:prstGeom prst="rect">
             <a:avLst/>
           </a:prstGeom>
         </p:spPr>
       </p:pic>
-      <p:sp>
-        <p:nvSpPr>
-          <p:cNvPr id="3" name="TextBox 2"/>
-          <p:cNvSpPr txBox="1"/>
+      <p:pic>
+        <p:nvPicPr>
+          <p:cNvPr id="4" name="Picture 3"/>
+          <p:cNvPicPr>
+            <a:picLocks noChangeAspect="1"/>
+          </p:cNvPicPr>
           <p:nvPr/>
-        </p:nvSpPr>
-        <p:spPr>
-          <a:xfrm>
-            <a:off x="3810000" y="6091986"/>
-            <a:ext cx="4572000" cy="369332"/>
+        </p:nvPicPr>
+        <p:blipFill>
+          <a:blip r:embed="rId3">
+            <a:extLst>
+              <a:ext uri="{28A0092B-C50C-407E-A947-70E740481C1C}">
+                <a14:useLocalDpi xmlns:a14="http://schemas.microsoft.com/office/drawing/2010/main" val="0"/>
+              </a:ext>
+            </a:extLst>
+          </a:blip>
+          <a:stretch>
+            <a:fillRect/>
+          </a:stretch>
+        </p:blipFill>
+        <p:spPr>
+          <a:xfrm>
+            <a:off x="6400800" y="0"/>
+            <a:ext cx="5299363" cy="6858000"/>
           </a:xfrm>
           <a:prstGeom prst="rect">
             <a:avLst/>
           </a:prstGeom>
-          <a:noFill/>
-        </p:spPr>
-        <p:txBody>
-          <a:bodyPr wrap="square" rtlCol="0">
-            <a:spAutoFit/>
-          </a:bodyPr>
-          <a:lstStyle/>
-          <a:p>
-            <a:r>
-              <a:rPr lang="en-US" dirty="0"/>
-              <a:t>Global spatial autocorrelation for poverty ratio</a:t>
-            </a:r>
-          </a:p>
-        </p:txBody>
-      </p:sp>
+        </p:spPr>
+      </p:pic>
     </p:spTree>
     <p:extLst>
       <p:ext uri="{BB962C8B-B14F-4D97-AF65-F5344CB8AC3E}">
-        <p14:creationId xmlns:p14="http://schemas.microsoft.com/office/powerpoint/2010/main" val="448111928"/>
+        <p14:creationId xmlns:p14="http://schemas.microsoft.com/office/powerpoint/2010/main" val="3994518001"/>
       </p:ext>
     </p:extLst>
   </p:cSld>
@@ -4437,56 +5200,22 @@
       </p:grpSpPr>
       <p:pic>
         <p:nvPicPr>
-          <p:cNvPr id="5" name="Picture 4"/>
-          <p:cNvPicPr>
-            <a:picLocks noChangeAspect="1"/>
-          </p:cNvPicPr>
-          <p:nvPr/>
-        </p:nvPicPr>
-        <p:blipFill rotWithShape="1">
-          <a:blip r:embed="rId2">
-            <a:extLst>
-              <a:ext uri="{28A0092B-C50C-407E-A947-70E740481C1C}">
-                <a14:useLocalDpi xmlns:a14="http://schemas.microsoft.com/office/drawing/2010/main" val="0"/>
-              </a:ext>
-            </a:extLst>
-          </a:blip>
-          <a:srcRect l="25182" r="6394"/>
-          <a:stretch/>
-        </p:blipFill>
-        <p:spPr>
-          <a:xfrm>
-            <a:off x="7591952" y="989416"/>
-            <a:ext cx="4572000" cy="4802071"/>
-          </a:xfrm>
-          <a:prstGeom prst="rect">
-            <a:avLst/>
-          </a:prstGeom>
-        </p:spPr>
-      </p:pic>
-      <p:pic>
-        <p:nvPicPr>
           <p:cNvPr id="4" name="Picture 3"/>
           <p:cNvPicPr>
             <a:picLocks noChangeAspect="1"/>
           </p:cNvPicPr>
           <p:nvPr/>
         </p:nvPicPr>
-        <p:blipFill rotWithShape="1">
-          <a:blip r:embed="rId3">
-            <a:extLst>
-              <a:ext uri="{28A0092B-C50C-407E-A947-70E740481C1C}">
-                <a14:useLocalDpi xmlns:a14="http://schemas.microsoft.com/office/drawing/2010/main" val="0"/>
-              </a:ext>
-            </a:extLst>
-          </a:blip>
-          <a:srcRect l="25248" r="7187"/>
-          <a:stretch/>
+        <p:blipFill>
+          <a:blip r:embed="rId2"/>
+          <a:stretch>
+            <a:fillRect/>
+          </a:stretch>
         </p:blipFill>
         <p:spPr>
           <a:xfrm>
-            <a:off x="3179109" y="958892"/>
-            <a:ext cx="4572000" cy="4863118"/>
+            <a:off x="2575472" y="622853"/>
+            <a:ext cx="7041057" cy="3200400"/>
           </a:xfrm>
           <a:prstGeom prst="rect">
             <a:avLst/>
@@ -4495,27 +5224,22 @@
       </p:pic>
       <p:pic>
         <p:nvPicPr>
-          <p:cNvPr id="3" name="Picture 2"/>
+          <p:cNvPr id="2" name="Picture 1"/>
           <p:cNvPicPr>
             <a:picLocks noChangeAspect="1"/>
           </p:cNvPicPr>
           <p:nvPr/>
         </p:nvPicPr>
-        <p:blipFill rotWithShape="1">
-          <a:blip r:embed="rId4">
-            <a:extLst>
-              <a:ext uri="{28A0092B-C50C-407E-A947-70E740481C1C}">
-                <a14:useLocalDpi xmlns:a14="http://schemas.microsoft.com/office/drawing/2010/main" val="0"/>
-              </a:ext>
-            </a:extLst>
-          </a:blip>
-          <a:srcRect l="24778" r="25661"/>
-          <a:stretch/>
+        <p:blipFill>
+          <a:blip r:embed="rId3"/>
+          <a:stretch>
+            <a:fillRect/>
+          </a:stretch>
         </p:blipFill>
         <p:spPr>
           <a:xfrm>
-            <a:off x="0" y="1742884"/>
-            <a:ext cx="3200400" cy="3295134"/>
+            <a:off x="1981200" y="4287069"/>
+            <a:ext cx="8229600" cy="1634997"/>
           </a:xfrm>
           <a:prstGeom prst="rect">
             <a:avLst/>
@@ -4524,14 +5248,14 @@
       </p:pic>
       <p:sp>
         <p:nvSpPr>
-          <p:cNvPr id="6" name="TextBox 5"/>
+          <p:cNvPr id="3" name="TextBox 2"/>
           <p:cNvSpPr txBox="1"/>
           <p:nvPr/>
         </p:nvSpPr>
         <p:spPr>
           <a:xfrm>
-            <a:off x="609600" y="6091986"/>
-            <a:ext cx="10972800" cy="369332"/>
+            <a:off x="1981200" y="5922066"/>
+            <a:ext cx="8229600" cy="338554"/>
           </a:xfrm>
           <a:prstGeom prst="rect">
             <a:avLst/>
@@ -4545,8 +5269,16 @@
           <a:lstStyle/>
           <a:p>
             <a:r>
-              <a:rPr lang="en-US" dirty="0"/>
-              <a:t>Bivariate LISA indicates mostly positive spatial autocorrelation between Black population ratio and poverty.</a:t>
+              <a:rPr lang="en-US" sz="1600" dirty="0"/>
+              <a:t>Table created by Dr. J. S. </a:t>
+            </a:r>
+            <a:r>
+              <a:rPr lang="en-US" sz="1600" dirty="0" err="1"/>
+              <a:t>Onésimo</a:t>
+            </a:r>
+            <a:r>
+              <a:rPr lang="en-US" sz="1600" dirty="0"/>
+              <a:t> Sandoval, Saint Louis University </a:t>
             </a:r>
           </a:p>
         </p:txBody>
@@ -4554,7 +5286,7 @@
     </p:spTree>
     <p:extLst>
       <p:ext uri="{BB962C8B-B14F-4D97-AF65-F5344CB8AC3E}">
-        <p14:creationId xmlns:p14="http://schemas.microsoft.com/office/powerpoint/2010/main" val="2400817694"/>
+        <p14:creationId xmlns:p14="http://schemas.microsoft.com/office/powerpoint/2010/main" val="47398568"/>
       </p:ext>
     </p:extLst>
   </p:cSld>
@@ -4589,7 +5321,7 @@
           </p:cNvPicPr>
           <p:nvPr/>
         </p:nvPicPr>
-        <p:blipFill rotWithShape="1">
+        <p:blipFill>
           <a:blip r:embed="rId2">
             <a:extLst>
               <a:ext uri="{28A0092B-C50C-407E-A947-70E740481C1C}">
@@ -4597,87 +5329,30 @@
               </a:ext>
             </a:extLst>
           </a:blip>
-          <a:srcRect l="24291" r="26396"/>
-          <a:stretch/>
+          <a:stretch>
+            <a:fillRect/>
+          </a:stretch>
         </p:blipFill>
         <p:spPr>
           <a:xfrm>
-            <a:off x="0" y="1818704"/>
-            <a:ext cx="3200400" cy="3311525"/>
+            <a:off x="1168046" y="849699"/>
+            <a:ext cx="9855909" cy="5029200"/>
           </a:xfrm>
           <a:prstGeom prst="rect">
             <a:avLst/>
           </a:prstGeom>
         </p:spPr>
       </p:pic>
-      <p:pic>
-        <p:nvPicPr>
-          <p:cNvPr id="3" name="Picture 2"/>
-          <p:cNvPicPr>
-            <a:picLocks noChangeAspect="1"/>
-          </p:cNvPicPr>
-          <p:nvPr/>
-        </p:nvPicPr>
-        <p:blipFill rotWithShape="1">
-          <a:blip r:embed="rId3">
-            <a:extLst>
-              <a:ext uri="{28A0092B-C50C-407E-A947-70E740481C1C}">
-                <a14:useLocalDpi xmlns:a14="http://schemas.microsoft.com/office/drawing/2010/main" val="0"/>
-              </a:ext>
-            </a:extLst>
-          </a:blip>
-          <a:srcRect l="25187" r="7820"/>
-          <a:stretch/>
-        </p:blipFill>
-        <p:spPr>
-          <a:xfrm>
-            <a:off x="3200400" y="1022121"/>
-            <a:ext cx="4572000" cy="4904690"/>
-          </a:xfrm>
-          <a:prstGeom prst="rect">
-            <a:avLst/>
-          </a:prstGeom>
-        </p:spPr>
-      </p:pic>
-      <p:pic>
-        <p:nvPicPr>
-          <p:cNvPr id="4" name="Picture 3"/>
-          <p:cNvPicPr>
-            <a:picLocks noChangeAspect="1"/>
-          </p:cNvPicPr>
-          <p:nvPr/>
-        </p:nvPicPr>
-        <p:blipFill rotWithShape="1">
-          <a:blip r:embed="rId4">
-            <a:extLst>
-              <a:ext uri="{28A0092B-C50C-407E-A947-70E740481C1C}">
-                <a14:useLocalDpi xmlns:a14="http://schemas.microsoft.com/office/drawing/2010/main" val="0"/>
-              </a:ext>
-            </a:extLst>
-          </a:blip>
-          <a:srcRect l="25760" r="6960"/>
-          <a:stretch/>
-        </p:blipFill>
-        <p:spPr>
-          <a:xfrm>
-            <a:off x="7620000" y="1032561"/>
-            <a:ext cx="4572000" cy="4883810"/>
-          </a:xfrm>
-          <a:prstGeom prst="rect">
-            <a:avLst/>
-          </a:prstGeom>
-        </p:spPr>
-      </p:pic>
-      <p:sp>
-        <p:nvSpPr>
-          <p:cNvPr id="5" name="TextBox 4"/>
+      <p:sp>
+        <p:nvSpPr>
+          <p:cNvPr id="3" name="TextBox 2"/>
           <p:cNvSpPr txBox="1"/>
           <p:nvPr/>
         </p:nvSpPr>
         <p:spPr>
           <a:xfrm>
-            <a:off x="609600" y="6091986"/>
-            <a:ext cx="10972800" cy="369332"/>
+            <a:off x="3810000" y="6091986"/>
+            <a:ext cx="4572000" cy="369332"/>
           </a:xfrm>
           <a:prstGeom prst="rect">
             <a:avLst/>
@@ -4692,7 +5367,7 @@
           <a:p>
             <a:r>
               <a:rPr lang="en-US" dirty="0"/>
-              <a:t>Bivariate LISA indicates mostly negative spatial autocorrelation between White population ratio and poverty.</a:t>
+              <a:t>Global spatial autocorrelation for poverty ratio</a:t>
             </a:r>
           </a:p>
         </p:txBody>
@@ -4700,7 +5375,7 @@
     </p:spTree>
     <p:extLst>
       <p:ext uri="{BB962C8B-B14F-4D97-AF65-F5344CB8AC3E}">
-        <p14:creationId xmlns:p14="http://schemas.microsoft.com/office/powerpoint/2010/main" val="1519220900"/>
+        <p14:creationId xmlns:p14="http://schemas.microsoft.com/office/powerpoint/2010/main" val="448111928"/>
       </p:ext>
     </p:extLst>
   </p:cSld>

</xml_diff>